<commit_message>
[docs] update r128 ppt
Signed-off-by: YuzukiTsuru <gloomyghost@gloomyghost.com>
</commit_message>
<xml_diff>
--- a/docs/assets/info/R128.pptx
+++ b/docs/assets/info/R128.pptx
@@ -1,15 +1,18 @@
 
 <file path=ppt/presentation.xml><?xml version="1.0" encoding="utf-8"?>
-<p:presentation xmlns:a="http://schemas.openxmlformats.org/drawingml/2006/main" xmlns:r="http://schemas.openxmlformats.org/officeDocument/2006/relationships" xmlns:p="http://schemas.openxmlformats.org/presentationml/2006/main" saveSubsetFonts="1">
+<p:presentation xmlns:a="http://schemas.openxmlformats.org/drawingml/2006/main" xmlns:r="http://schemas.openxmlformats.org/officeDocument/2006/relationships" xmlns:p="http://schemas.openxmlformats.org/presentationml/2006/main">
   <p:sldMasterIdLst>
     <p:sldMasterId id="2147483648" r:id="rId1"/>
   </p:sldMasterIdLst>
   <p:sldIdLst>
-    <p:sldId id="256" r:id="rId2"/>
-    <p:sldId id="258" r:id="rId3"/>
+    <p:sldId id="256" r:id="rId3"/>
+    <p:sldId id="258" r:id="rId4"/>
   </p:sldIdLst>
   <p:sldSz cx="12192000" cy="6858000"/>
   <p:notesSz cx="6858000" cy="9144000"/>
+  <p:custDataLst>
+    <p:tags r:id="rId8"/>
+  </p:custDataLst>
   <p:defaultTextStyle>
     <a:defPPr>
       <a:defRPr lang="en-US"/>
@@ -105,11 +108,6 @@
       </a:defRPr>
     </a:lvl9pPr>
   </p:defaultTextStyle>
-  <p:extLst>
-    <p:ext uri="{EFAFB233-063F-42B5-8137-9DF3F51BA10A}">
-      <p15:sldGuideLst xmlns:p15="http://schemas.microsoft.com/office/powerpoint/2012/main"/>
-    </p:ext>
-  </p:extLst>
 </p:presentation>
 </file>
 
@@ -132,13 +130,7 @@
       </p:grpSpPr>
       <p:sp>
         <p:nvSpPr>
-          <p:cNvPr id="2" name="标题 1">
-            <a:extLst>
-              <a:ext uri="{FF2B5EF4-FFF2-40B4-BE49-F238E27FC236}">
-                <a16:creationId xmlns:a16="http://schemas.microsoft.com/office/drawing/2014/main" id="{15FFB7C3-4004-7424-3630-6D76F469ACB6}"/>
-              </a:ext>
-            </a:extLst>
-          </p:cNvPr>
+          <p:cNvPr id="2" name="标题 1"/>
           <p:cNvSpPr>
             <a:spLocks noGrp="1"/>
           </p:cNvSpPr>
@@ -170,13 +162,7 @@
       </p:sp>
       <p:sp>
         <p:nvSpPr>
-          <p:cNvPr id="3" name="副标题 2">
-            <a:extLst>
-              <a:ext uri="{FF2B5EF4-FFF2-40B4-BE49-F238E27FC236}">
-                <a16:creationId xmlns:a16="http://schemas.microsoft.com/office/drawing/2014/main" id="{CFC2A38E-272A-A72B-2A04-613DCBAF42D6}"/>
-              </a:ext>
-            </a:extLst>
-          </p:cNvPr>
+          <p:cNvPr id="3" name="副标题 2"/>
           <p:cNvSpPr>
             <a:spLocks noGrp="1"/>
           </p:cNvSpPr>
@@ -241,13 +227,7 @@
       </p:sp>
       <p:sp>
         <p:nvSpPr>
-          <p:cNvPr id="4" name="日期占位符 3">
-            <a:extLst>
-              <a:ext uri="{FF2B5EF4-FFF2-40B4-BE49-F238E27FC236}">
-                <a16:creationId xmlns:a16="http://schemas.microsoft.com/office/drawing/2014/main" id="{8E2F70D2-C619-BD6B-FE6D-824ED31F862F}"/>
-              </a:ext>
-            </a:extLst>
-          </p:cNvPr>
+          <p:cNvPr id="4" name="日期占位符 3"/>
           <p:cNvSpPr>
             <a:spLocks noGrp="1"/>
           </p:cNvSpPr>
@@ -262,7 +242,6 @@
           <a:p>
             <a:fld id="{867BD015-EE8C-4392-AE99-E743ABF6B72E}" type="datetimeFigureOut">
               <a:rPr lang="en-US" smtClean="0"/>
-              <a:t>3/15/2023</a:t>
             </a:fld>
             <a:endParaRPr lang="en-US"/>
           </a:p>
@@ -270,13 +249,7 @@
       </p:sp>
       <p:sp>
         <p:nvSpPr>
-          <p:cNvPr id="5" name="页脚占位符 4">
-            <a:extLst>
-              <a:ext uri="{FF2B5EF4-FFF2-40B4-BE49-F238E27FC236}">
-                <a16:creationId xmlns:a16="http://schemas.microsoft.com/office/drawing/2014/main" id="{E17E0D67-045A-BF0E-A377-23334538200F}"/>
-              </a:ext>
-            </a:extLst>
-          </p:cNvPr>
+          <p:cNvPr id="5" name="页脚占位符 4"/>
           <p:cNvSpPr>
             <a:spLocks noGrp="1"/>
           </p:cNvSpPr>
@@ -295,13 +268,7 @@
       </p:sp>
       <p:sp>
         <p:nvSpPr>
-          <p:cNvPr id="6" name="灯片编号占位符 5">
-            <a:extLst>
-              <a:ext uri="{FF2B5EF4-FFF2-40B4-BE49-F238E27FC236}">
-                <a16:creationId xmlns:a16="http://schemas.microsoft.com/office/drawing/2014/main" id="{17FC8D8E-ABA6-1612-5A68-EFCA6E9D6DE4}"/>
-              </a:ext>
-            </a:extLst>
-          </p:cNvPr>
+          <p:cNvPr id="6" name="灯片编号占位符 5"/>
           <p:cNvSpPr>
             <a:spLocks noGrp="1"/>
           </p:cNvSpPr>
@@ -316,18 +283,12 @@
           <a:p>
             <a:fld id="{85CB34D2-D757-4754-A73E-1EED158EE8DB}" type="slidenum">
               <a:rPr lang="en-US" smtClean="0"/>
-              <a:t>‹#›</a:t>
             </a:fld>
             <a:endParaRPr lang="en-US"/>
           </a:p>
         </p:txBody>
       </p:sp>
     </p:spTree>
-    <p:extLst>
-      <p:ext uri="{BB962C8B-B14F-4D97-AF65-F5344CB8AC3E}">
-        <p14:creationId xmlns:p14="http://schemas.microsoft.com/office/powerpoint/2010/main" val="4206911010"/>
-      </p:ext>
-    </p:extLst>
   </p:cSld>
   <p:clrMapOvr>
     <a:masterClrMapping/>
@@ -354,13 +315,7 @@
       </p:grpSpPr>
       <p:sp>
         <p:nvSpPr>
-          <p:cNvPr id="2" name="标题 1">
-            <a:extLst>
-              <a:ext uri="{FF2B5EF4-FFF2-40B4-BE49-F238E27FC236}">
-                <a16:creationId xmlns:a16="http://schemas.microsoft.com/office/drawing/2014/main" id="{47A69865-5D78-A794-63EF-97E03402F67F}"/>
-              </a:ext>
-            </a:extLst>
-          </p:cNvPr>
+          <p:cNvPr id="2" name="标题 1"/>
           <p:cNvSpPr>
             <a:spLocks noGrp="1"/>
           </p:cNvSpPr>
@@ -383,13 +338,7 @@
       </p:sp>
       <p:sp>
         <p:nvSpPr>
-          <p:cNvPr id="3" name="竖排文字占位符 2">
-            <a:extLst>
-              <a:ext uri="{FF2B5EF4-FFF2-40B4-BE49-F238E27FC236}">
-                <a16:creationId xmlns:a16="http://schemas.microsoft.com/office/drawing/2014/main" id="{45264A2E-C1BD-99D0-CDA8-824E78DEAAF9}"/>
-              </a:ext>
-            </a:extLst>
-          </p:cNvPr>
+          <p:cNvPr id="3" name="竖排文字占位符 2"/>
           <p:cNvSpPr>
             <a:spLocks noGrp="1"/>
           </p:cNvSpPr>
@@ -407,6 +356,7 @@
               <a:rPr lang="zh-CN" altLang="en-US"/>
               <a:t>单击此处编辑母版文本样式</a:t>
             </a:r>
+            <a:endParaRPr lang="zh-CN" altLang="en-US"/>
           </a:p>
           <a:p>
             <a:pPr lvl="1"/>
@@ -414,6 +364,7 @@
               <a:rPr lang="zh-CN" altLang="en-US"/>
               <a:t>二级</a:t>
             </a:r>
+            <a:endParaRPr lang="zh-CN" altLang="en-US"/>
           </a:p>
           <a:p>
             <a:pPr lvl="2"/>
@@ -421,6 +372,7 @@
               <a:rPr lang="zh-CN" altLang="en-US"/>
               <a:t>三级</a:t>
             </a:r>
+            <a:endParaRPr lang="zh-CN" altLang="en-US"/>
           </a:p>
           <a:p>
             <a:pPr lvl="3"/>
@@ -428,6 +380,7 @@
               <a:rPr lang="zh-CN" altLang="en-US"/>
               <a:t>四级</a:t>
             </a:r>
+            <a:endParaRPr lang="zh-CN" altLang="en-US"/>
           </a:p>
           <a:p>
             <a:pPr lvl="4"/>
@@ -441,13 +394,7 @@
       </p:sp>
       <p:sp>
         <p:nvSpPr>
-          <p:cNvPr id="4" name="日期占位符 3">
-            <a:extLst>
-              <a:ext uri="{FF2B5EF4-FFF2-40B4-BE49-F238E27FC236}">
-                <a16:creationId xmlns:a16="http://schemas.microsoft.com/office/drawing/2014/main" id="{4EF29B73-F189-060C-930C-519EB0011AB6}"/>
-              </a:ext>
-            </a:extLst>
-          </p:cNvPr>
+          <p:cNvPr id="4" name="日期占位符 3"/>
           <p:cNvSpPr>
             <a:spLocks noGrp="1"/>
           </p:cNvSpPr>
@@ -462,7 +409,6 @@
           <a:p>
             <a:fld id="{867BD015-EE8C-4392-AE99-E743ABF6B72E}" type="datetimeFigureOut">
               <a:rPr lang="en-US" smtClean="0"/>
-              <a:t>3/15/2023</a:t>
             </a:fld>
             <a:endParaRPr lang="en-US"/>
           </a:p>
@@ -470,13 +416,7 @@
       </p:sp>
       <p:sp>
         <p:nvSpPr>
-          <p:cNvPr id="5" name="页脚占位符 4">
-            <a:extLst>
-              <a:ext uri="{FF2B5EF4-FFF2-40B4-BE49-F238E27FC236}">
-                <a16:creationId xmlns:a16="http://schemas.microsoft.com/office/drawing/2014/main" id="{ADA6F31C-9CCB-2108-8514-5324B3FE341E}"/>
-              </a:ext>
-            </a:extLst>
-          </p:cNvPr>
+          <p:cNvPr id="5" name="页脚占位符 4"/>
           <p:cNvSpPr>
             <a:spLocks noGrp="1"/>
           </p:cNvSpPr>
@@ -495,13 +435,7 @@
       </p:sp>
       <p:sp>
         <p:nvSpPr>
-          <p:cNvPr id="6" name="灯片编号占位符 5">
-            <a:extLst>
-              <a:ext uri="{FF2B5EF4-FFF2-40B4-BE49-F238E27FC236}">
-                <a16:creationId xmlns:a16="http://schemas.microsoft.com/office/drawing/2014/main" id="{AE4E73C4-145F-D53A-3625-65A759054592}"/>
-              </a:ext>
-            </a:extLst>
-          </p:cNvPr>
+          <p:cNvPr id="6" name="灯片编号占位符 5"/>
           <p:cNvSpPr>
             <a:spLocks noGrp="1"/>
           </p:cNvSpPr>
@@ -516,18 +450,12 @@
           <a:p>
             <a:fld id="{85CB34D2-D757-4754-A73E-1EED158EE8DB}" type="slidenum">
               <a:rPr lang="en-US" smtClean="0"/>
-              <a:t>‹#›</a:t>
             </a:fld>
             <a:endParaRPr lang="en-US"/>
           </a:p>
         </p:txBody>
       </p:sp>
     </p:spTree>
-    <p:extLst>
-      <p:ext uri="{BB962C8B-B14F-4D97-AF65-F5344CB8AC3E}">
-        <p14:creationId xmlns:p14="http://schemas.microsoft.com/office/powerpoint/2010/main" val="348982422"/>
-      </p:ext>
-    </p:extLst>
   </p:cSld>
   <p:clrMapOvr>
     <a:masterClrMapping/>
@@ -554,13 +482,7 @@
       </p:grpSpPr>
       <p:sp>
         <p:nvSpPr>
-          <p:cNvPr id="2" name="竖排标题 1">
-            <a:extLst>
-              <a:ext uri="{FF2B5EF4-FFF2-40B4-BE49-F238E27FC236}">
-                <a16:creationId xmlns:a16="http://schemas.microsoft.com/office/drawing/2014/main" id="{AB8F7ACD-89F7-D8C0-DAB0-EF4C4F1E705E}"/>
-              </a:ext>
-            </a:extLst>
-          </p:cNvPr>
+          <p:cNvPr id="2" name="竖排标题 1"/>
           <p:cNvSpPr>
             <a:spLocks noGrp="1"/>
           </p:cNvSpPr>
@@ -588,13 +510,7 @@
       </p:sp>
       <p:sp>
         <p:nvSpPr>
-          <p:cNvPr id="3" name="竖排文字占位符 2">
-            <a:extLst>
-              <a:ext uri="{FF2B5EF4-FFF2-40B4-BE49-F238E27FC236}">
-                <a16:creationId xmlns:a16="http://schemas.microsoft.com/office/drawing/2014/main" id="{E248F96D-333F-D4F7-277E-721E552CB477}"/>
-              </a:ext>
-            </a:extLst>
-          </p:cNvPr>
+          <p:cNvPr id="3" name="竖排文字占位符 2"/>
           <p:cNvSpPr>
             <a:spLocks noGrp="1"/>
           </p:cNvSpPr>
@@ -617,6 +533,7 @@
               <a:rPr lang="zh-CN" altLang="en-US"/>
               <a:t>单击此处编辑母版文本样式</a:t>
             </a:r>
+            <a:endParaRPr lang="zh-CN" altLang="en-US"/>
           </a:p>
           <a:p>
             <a:pPr lvl="1"/>
@@ -624,6 +541,7 @@
               <a:rPr lang="zh-CN" altLang="en-US"/>
               <a:t>二级</a:t>
             </a:r>
+            <a:endParaRPr lang="zh-CN" altLang="en-US"/>
           </a:p>
           <a:p>
             <a:pPr lvl="2"/>
@@ -631,6 +549,7 @@
               <a:rPr lang="zh-CN" altLang="en-US"/>
               <a:t>三级</a:t>
             </a:r>
+            <a:endParaRPr lang="zh-CN" altLang="en-US"/>
           </a:p>
           <a:p>
             <a:pPr lvl="3"/>
@@ -638,6 +557,7 @@
               <a:rPr lang="zh-CN" altLang="en-US"/>
               <a:t>四级</a:t>
             </a:r>
+            <a:endParaRPr lang="zh-CN" altLang="en-US"/>
           </a:p>
           <a:p>
             <a:pPr lvl="4"/>
@@ -651,13 +571,7 @@
       </p:sp>
       <p:sp>
         <p:nvSpPr>
-          <p:cNvPr id="4" name="日期占位符 3">
-            <a:extLst>
-              <a:ext uri="{FF2B5EF4-FFF2-40B4-BE49-F238E27FC236}">
-                <a16:creationId xmlns:a16="http://schemas.microsoft.com/office/drawing/2014/main" id="{C553175D-7229-6520-46F6-39451D781041}"/>
-              </a:ext>
-            </a:extLst>
-          </p:cNvPr>
+          <p:cNvPr id="4" name="日期占位符 3"/>
           <p:cNvSpPr>
             <a:spLocks noGrp="1"/>
           </p:cNvSpPr>
@@ -672,7 +586,6 @@
           <a:p>
             <a:fld id="{867BD015-EE8C-4392-AE99-E743ABF6B72E}" type="datetimeFigureOut">
               <a:rPr lang="en-US" smtClean="0"/>
-              <a:t>3/15/2023</a:t>
             </a:fld>
             <a:endParaRPr lang="en-US"/>
           </a:p>
@@ -680,13 +593,7 @@
       </p:sp>
       <p:sp>
         <p:nvSpPr>
-          <p:cNvPr id="5" name="页脚占位符 4">
-            <a:extLst>
-              <a:ext uri="{FF2B5EF4-FFF2-40B4-BE49-F238E27FC236}">
-                <a16:creationId xmlns:a16="http://schemas.microsoft.com/office/drawing/2014/main" id="{D84594BE-B09C-309B-F10D-6430BA21012E}"/>
-              </a:ext>
-            </a:extLst>
-          </p:cNvPr>
+          <p:cNvPr id="5" name="页脚占位符 4"/>
           <p:cNvSpPr>
             <a:spLocks noGrp="1"/>
           </p:cNvSpPr>
@@ -705,13 +612,7 @@
       </p:sp>
       <p:sp>
         <p:nvSpPr>
-          <p:cNvPr id="6" name="灯片编号占位符 5">
-            <a:extLst>
-              <a:ext uri="{FF2B5EF4-FFF2-40B4-BE49-F238E27FC236}">
-                <a16:creationId xmlns:a16="http://schemas.microsoft.com/office/drawing/2014/main" id="{85974F54-9785-B345-333F-DF666963EF45}"/>
-              </a:ext>
-            </a:extLst>
-          </p:cNvPr>
+          <p:cNvPr id="6" name="灯片编号占位符 5"/>
           <p:cNvSpPr>
             <a:spLocks noGrp="1"/>
           </p:cNvSpPr>
@@ -726,18 +627,12 @@
           <a:p>
             <a:fld id="{85CB34D2-D757-4754-A73E-1EED158EE8DB}" type="slidenum">
               <a:rPr lang="en-US" smtClean="0"/>
-              <a:t>‹#›</a:t>
             </a:fld>
             <a:endParaRPr lang="en-US"/>
           </a:p>
         </p:txBody>
       </p:sp>
     </p:spTree>
-    <p:extLst>
-      <p:ext uri="{BB962C8B-B14F-4D97-AF65-F5344CB8AC3E}">
-        <p14:creationId xmlns:p14="http://schemas.microsoft.com/office/powerpoint/2010/main" val="884199851"/>
-      </p:ext>
-    </p:extLst>
   </p:cSld>
   <p:clrMapOvr>
     <a:masterClrMapping/>
@@ -764,13 +659,7 @@
       </p:grpSpPr>
       <p:sp>
         <p:nvSpPr>
-          <p:cNvPr id="2" name="标题 1">
-            <a:extLst>
-              <a:ext uri="{FF2B5EF4-FFF2-40B4-BE49-F238E27FC236}">
-                <a16:creationId xmlns:a16="http://schemas.microsoft.com/office/drawing/2014/main" id="{611100D9-A746-2207-E077-88E5299C38B4}"/>
-              </a:ext>
-            </a:extLst>
-          </p:cNvPr>
+          <p:cNvPr id="2" name="标题 1"/>
           <p:cNvSpPr>
             <a:spLocks noGrp="1"/>
           </p:cNvSpPr>
@@ -793,13 +682,7 @@
       </p:sp>
       <p:sp>
         <p:nvSpPr>
-          <p:cNvPr id="3" name="内容占位符 2">
-            <a:extLst>
-              <a:ext uri="{FF2B5EF4-FFF2-40B4-BE49-F238E27FC236}">
-                <a16:creationId xmlns:a16="http://schemas.microsoft.com/office/drawing/2014/main" id="{D23472C0-9489-35AA-0373-FB997FEC4E8C}"/>
-              </a:ext>
-            </a:extLst>
-          </p:cNvPr>
+          <p:cNvPr id="3" name="内容占位符 2"/>
           <p:cNvSpPr>
             <a:spLocks noGrp="1"/>
           </p:cNvSpPr>
@@ -817,6 +700,7 @@
               <a:rPr lang="zh-CN" altLang="en-US"/>
               <a:t>单击此处编辑母版文本样式</a:t>
             </a:r>
+            <a:endParaRPr lang="zh-CN" altLang="en-US"/>
           </a:p>
           <a:p>
             <a:pPr lvl="1"/>
@@ -824,6 +708,7 @@
               <a:rPr lang="zh-CN" altLang="en-US"/>
               <a:t>二级</a:t>
             </a:r>
+            <a:endParaRPr lang="zh-CN" altLang="en-US"/>
           </a:p>
           <a:p>
             <a:pPr lvl="2"/>
@@ -831,6 +716,7 @@
               <a:rPr lang="zh-CN" altLang="en-US"/>
               <a:t>三级</a:t>
             </a:r>
+            <a:endParaRPr lang="zh-CN" altLang="en-US"/>
           </a:p>
           <a:p>
             <a:pPr lvl="3"/>
@@ -838,6 +724,7 @@
               <a:rPr lang="zh-CN" altLang="en-US"/>
               <a:t>四级</a:t>
             </a:r>
+            <a:endParaRPr lang="zh-CN" altLang="en-US"/>
           </a:p>
           <a:p>
             <a:pPr lvl="4"/>
@@ -851,13 +738,7 @@
       </p:sp>
       <p:sp>
         <p:nvSpPr>
-          <p:cNvPr id="4" name="日期占位符 3">
-            <a:extLst>
-              <a:ext uri="{FF2B5EF4-FFF2-40B4-BE49-F238E27FC236}">
-                <a16:creationId xmlns:a16="http://schemas.microsoft.com/office/drawing/2014/main" id="{0AB9C466-CE04-4494-7D6E-B587BECC94A6}"/>
-              </a:ext>
-            </a:extLst>
-          </p:cNvPr>
+          <p:cNvPr id="4" name="日期占位符 3"/>
           <p:cNvSpPr>
             <a:spLocks noGrp="1"/>
           </p:cNvSpPr>
@@ -872,7 +753,6 @@
           <a:p>
             <a:fld id="{867BD015-EE8C-4392-AE99-E743ABF6B72E}" type="datetimeFigureOut">
               <a:rPr lang="en-US" smtClean="0"/>
-              <a:t>3/15/2023</a:t>
             </a:fld>
             <a:endParaRPr lang="en-US"/>
           </a:p>
@@ -880,13 +760,7 @@
       </p:sp>
       <p:sp>
         <p:nvSpPr>
-          <p:cNvPr id="5" name="页脚占位符 4">
-            <a:extLst>
-              <a:ext uri="{FF2B5EF4-FFF2-40B4-BE49-F238E27FC236}">
-                <a16:creationId xmlns:a16="http://schemas.microsoft.com/office/drawing/2014/main" id="{48EB3E15-375B-57A5-6FAD-FDF960E002F1}"/>
-              </a:ext>
-            </a:extLst>
-          </p:cNvPr>
+          <p:cNvPr id="5" name="页脚占位符 4"/>
           <p:cNvSpPr>
             <a:spLocks noGrp="1"/>
           </p:cNvSpPr>
@@ -905,13 +779,7 @@
       </p:sp>
       <p:sp>
         <p:nvSpPr>
-          <p:cNvPr id="6" name="灯片编号占位符 5">
-            <a:extLst>
-              <a:ext uri="{FF2B5EF4-FFF2-40B4-BE49-F238E27FC236}">
-                <a16:creationId xmlns:a16="http://schemas.microsoft.com/office/drawing/2014/main" id="{CBAC3E90-4187-16DA-84D6-A831FE0AA253}"/>
-              </a:ext>
-            </a:extLst>
-          </p:cNvPr>
+          <p:cNvPr id="6" name="灯片编号占位符 5"/>
           <p:cNvSpPr>
             <a:spLocks noGrp="1"/>
           </p:cNvSpPr>
@@ -926,18 +794,12 @@
           <a:p>
             <a:fld id="{85CB34D2-D757-4754-A73E-1EED158EE8DB}" type="slidenum">
               <a:rPr lang="en-US" smtClean="0"/>
-              <a:t>‹#›</a:t>
             </a:fld>
             <a:endParaRPr lang="en-US"/>
           </a:p>
         </p:txBody>
       </p:sp>
     </p:spTree>
-    <p:extLst>
-      <p:ext uri="{BB962C8B-B14F-4D97-AF65-F5344CB8AC3E}">
-        <p14:creationId xmlns:p14="http://schemas.microsoft.com/office/powerpoint/2010/main" val="3522813099"/>
-      </p:ext>
-    </p:extLst>
   </p:cSld>
   <p:clrMapOvr>
     <a:masterClrMapping/>
@@ -964,13 +826,7 @@
       </p:grpSpPr>
       <p:sp>
         <p:nvSpPr>
-          <p:cNvPr id="2" name="标题 1">
-            <a:extLst>
-              <a:ext uri="{FF2B5EF4-FFF2-40B4-BE49-F238E27FC236}">
-                <a16:creationId xmlns:a16="http://schemas.microsoft.com/office/drawing/2014/main" id="{9F3702C2-AB4E-87A3-E491-4189472449C9}"/>
-              </a:ext>
-            </a:extLst>
-          </p:cNvPr>
+          <p:cNvPr id="2" name="标题 1"/>
           <p:cNvSpPr>
             <a:spLocks noGrp="1"/>
           </p:cNvSpPr>
@@ -1002,13 +858,7 @@
       </p:sp>
       <p:sp>
         <p:nvSpPr>
-          <p:cNvPr id="3" name="文本占位符 2">
-            <a:extLst>
-              <a:ext uri="{FF2B5EF4-FFF2-40B4-BE49-F238E27FC236}">
-                <a16:creationId xmlns:a16="http://schemas.microsoft.com/office/drawing/2014/main" id="{79D7FD84-5DA8-DF51-862C-96D4962935C2}"/>
-              </a:ext>
-            </a:extLst>
-          </p:cNvPr>
+          <p:cNvPr id="3" name="文本占位符 2"/>
           <p:cNvSpPr>
             <a:spLocks noGrp="1"/>
           </p:cNvSpPr>
@@ -1122,18 +972,13 @@
               <a:rPr lang="zh-CN" altLang="en-US"/>
               <a:t>单击此处编辑母版文本样式</a:t>
             </a:r>
-          </a:p>
-        </p:txBody>
-      </p:sp>
-      <p:sp>
-        <p:nvSpPr>
-          <p:cNvPr id="4" name="日期占位符 3">
-            <a:extLst>
-              <a:ext uri="{FF2B5EF4-FFF2-40B4-BE49-F238E27FC236}">
-                <a16:creationId xmlns:a16="http://schemas.microsoft.com/office/drawing/2014/main" id="{E8FB6202-370B-B4FF-D7AC-A7FBE5AE3020}"/>
-              </a:ext>
-            </a:extLst>
-          </p:cNvPr>
+            <a:endParaRPr lang="zh-CN" altLang="en-US"/>
+          </a:p>
+        </p:txBody>
+      </p:sp>
+      <p:sp>
+        <p:nvSpPr>
+          <p:cNvPr id="4" name="日期占位符 3"/>
           <p:cNvSpPr>
             <a:spLocks noGrp="1"/>
           </p:cNvSpPr>
@@ -1148,7 +993,6 @@
           <a:p>
             <a:fld id="{867BD015-EE8C-4392-AE99-E743ABF6B72E}" type="datetimeFigureOut">
               <a:rPr lang="en-US" smtClean="0"/>
-              <a:t>3/15/2023</a:t>
             </a:fld>
             <a:endParaRPr lang="en-US"/>
           </a:p>
@@ -1156,13 +1000,7 @@
       </p:sp>
       <p:sp>
         <p:nvSpPr>
-          <p:cNvPr id="5" name="页脚占位符 4">
-            <a:extLst>
-              <a:ext uri="{FF2B5EF4-FFF2-40B4-BE49-F238E27FC236}">
-                <a16:creationId xmlns:a16="http://schemas.microsoft.com/office/drawing/2014/main" id="{ED107F6A-C5AB-E682-C3C2-C111FD16B466}"/>
-              </a:ext>
-            </a:extLst>
-          </p:cNvPr>
+          <p:cNvPr id="5" name="页脚占位符 4"/>
           <p:cNvSpPr>
             <a:spLocks noGrp="1"/>
           </p:cNvSpPr>
@@ -1181,13 +1019,7 @@
       </p:sp>
       <p:sp>
         <p:nvSpPr>
-          <p:cNvPr id="6" name="灯片编号占位符 5">
-            <a:extLst>
-              <a:ext uri="{FF2B5EF4-FFF2-40B4-BE49-F238E27FC236}">
-                <a16:creationId xmlns:a16="http://schemas.microsoft.com/office/drawing/2014/main" id="{E120DA0F-3C71-5025-7E10-BC165AFCB960}"/>
-              </a:ext>
-            </a:extLst>
-          </p:cNvPr>
+          <p:cNvPr id="6" name="灯片编号占位符 5"/>
           <p:cNvSpPr>
             <a:spLocks noGrp="1"/>
           </p:cNvSpPr>
@@ -1202,18 +1034,12 @@
           <a:p>
             <a:fld id="{85CB34D2-D757-4754-A73E-1EED158EE8DB}" type="slidenum">
               <a:rPr lang="en-US" smtClean="0"/>
-              <a:t>‹#›</a:t>
             </a:fld>
             <a:endParaRPr lang="en-US"/>
           </a:p>
         </p:txBody>
       </p:sp>
     </p:spTree>
-    <p:extLst>
-      <p:ext uri="{BB962C8B-B14F-4D97-AF65-F5344CB8AC3E}">
-        <p14:creationId xmlns:p14="http://schemas.microsoft.com/office/powerpoint/2010/main" val="3175300480"/>
-      </p:ext>
-    </p:extLst>
   </p:cSld>
   <p:clrMapOvr>
     <a:masterClrMapping/>
@@ -1240,13 +1066,7 @@
       </p:grpSpPr>
       <p:sp>
         <p:nvSpPr>
-          <p:cNvPr id="2" name="标题 1">
-            <a:extLst>
-              <a:ext uri="{FF2B5EF4-FFF2-40B4-BE49-F238E27FC236}">
-                <a16:creationId xmlns:a16="http://schemas.microsoft.com/office/drawing/2014/main" id="{833CB04F-EB6D-5D29-B33D-467624758F78}"/>
-              </a:ext>
-            </a:extLst>
-          </p:cNvPr>
+          <p:cNvPr id="2" name="标题 1"/>
           <p:cNvSpPr>
             <a:spLocks noGrp="1"/>
           </p:cNvSpPr>
@@ -1269,13 +1089,7 @@
       </p:sp>
       <p:sp>
         <p:nvSpPr>
-          <p:cNvPr id="3" name="内容占位符 2">
-            <a:extLst>
-              <a:ext uri="{FF2B5EF4-FFF2-40B4-BE49-F238E27FC236}">
-                <a16:creationId xmlns:a16="http://schemas.microsoft.com/office/drawing/2014/main" id="{E7A6BD95-EBFE-6ACA-CFC7-CF443076C451}"/>
-              </a:ext>
-            </a:extLst>
-          </p:cNvPr>
+          <p:cNvPr id="3" name="内容占位符 2"/>
           <p:cNvSpPr>
             <a:spLocks noGrp="1"/>
           </p:cNvSpPr>
@@ -1298,6 +1112,7 @@
               <a:rPr lang="zh-CN" altLang="en-US"/>
               <a:t>单击此处编辑母版文本样式</a:t>
             </a:r>
+            <a:endParaRPr lang="zh-CN" altLang="en-US"/>
           </a:p>
           <a:p>
             <a:pPr lvl="1"/>
@@ -1305,6 +1120,7 @@
               <a:rPr lang="zh-CN" altLang="en-US"/>
               <a:t>二级</a:t>
             </a:r>
+            <a:endParaRPr lang="zh-CN" altLang="en-US"/>
           </a:p>
           <a:p>
             <a:pPr lvl="2"/>
@@ -1312,6 +1128,7 @@
               <a:rPr lang="zh-CN" altLang="en-US"/>
               <a:t>三级</a:t>
             </a:r>
+            <a:endParaRPr lang="zh-CN" altLang="en-US"/>
           </a:p>
           <a:p>
             <a:pPr lvl="3"/>
@@ -1319,6 +1136,7 @@
               <a:rPr lang="zh-CN" altLang="en-US"/>
               <a:t>四级</a:t>
             </a:r>
+            <a:endParaRPr lang="zh-CN" altLang="en-US"/>
           </a:p>
           <a:p>
             <a:pPr lvl="4"/>
@@ -1332,13 +1150,7 @@
       </p:sp>
       <p:sp>
         <p:nvSpPr>
-          <p:cNvPr id="4" name="内容占位符 3">
-            <a:extLst>
-              <a:ext uri="{FF2B5EF4-FFF2-40B4-BE49-F238E27FC236}">
-                <a16:creationId xmlns:a16="http://schemas.microsoft.com/office/drawing/2014/main" id="{E4742FBF-88CC-B5EE-FC6A-200F78B4C252}"/>
-              </a:ext>
-            </a:extLst>
-          </p:cNvPr>
+          <p:cNvPr id="4" name="内容占位符 3"/>
           <p:cNvSpPr>
             <a:spLocks noGrp="1"/>
           </p:cNvSpPr>
@@ -1361,6 +1173,7 @@
               <a:rPr lang="zh-CN" altLang="en-US"/>
               <a:t>单击此处编辑母版文本样式</a:t>
             </a:r>
+            <a:endParaRPr lang="zh-CN" altLang="en-US"/>
           </a:p>
           <a:p>
             <a:pPr lvl="1"/>
@@ -1368,6 +1181,7 @@
               <a:rPr lang="zh-CN" altLang="en-US"/>
               <a:t>二级</a:t>
             </a:r>
+            <a:endParaRPr lang="zh-CN" altLang="en-US"/>
           </a:p>
           <a:p>
             <a:pPr lvl="2"/>
@@ -1375,6 +1189,7 @@
               <a:rPr lang="zh-CN" altLang="en-US"/>
               <a:t>三级</a:t>
             </a:r>
+            <a:endParaRPr lang="zh-CN" altLang="en-US"/>
           </a:p>
           <a:p>
             <a:pPr lvl="3"/>
@@ -1382,6 +1197,7 @@
               <a:rPr lang="zh-CN" altLang="en-US"/>
               <a:t>四级</a:t>
             </a:r>
+            <a:endParaRPr lang="zh-CN" altLang="en-US"/>
           </a:p>
           <a:p>
             <a:pPr lvl="4"/>
@@ -1395,13 +1211,7 @@
       </p:sp>
       <p:sp>
         <p:nvSpPr>
-          <p:cNvPr id="5" name="日期占位符 4">
-            <a:extLst>
-              <a:ext uri="{FF2B5EF4-FFF2-40B4-BE49-F238E27FC236}">
-                <a16:creationId xmlns:a16="http://schemas.microsoft.com/office/drawing/2014/main" id="{AA92C1C2-2716-6F8C-6294-4AC7F8CC0F58}"/>
-              </a:ext>
-            </a:extLst>
-          </p:cNvPr>
+          <p:cNvPr id="5" name="日期占位符 4"/>
           <p:cNvSpPr>
             <a:spLocks noGrp="1"/>
           </p:cNvSpPr>
@@ -1416,7 +1226,6 @@
           <a:p>
             <a:fld id="{867BD015-EE8C-4392-AE99-E743ABF6B72E}" type="datetimeFigureOut">
               <a:rPr lang="en-US" smtClean="0"/>
-              <a:t>3/15/2023</a:t>
             </a:fld>
             <a:endParaRPr lang="en-US"/>
           </a:p>
@@ -1424,13 +1233,7 @@
       </p:sp>
       <p:sp>
         <p:nvSpPr>
-          <p:cNvPr id="6" name="页脚占位符 5">
-            <a:extLst>
-              <a:ext uri="{FF2B5EF4-FFF2-40B4-BE49-F238E27FC236}">
-                <a16:creationId xmlns:a16="http://schemas.microsoft.com/office/drawing/2014/main" id="{199411B6-F229-139C-01D3-C1C34A8A7150}"/>
-              </a:ext>
-            </a:extLst>
-          </p:cNvPr>
+          <p:cNvPr id="6" name="页脚占位符 5"/>
           <p:cNvSpPr>
             <a:spLocks noGrp="1"/>
           </p:cNvSpPr>
@@ -1449,13 +1252,7 @@
       </p:sp>
       <p:sp>
         <p:nvSpPr>
-          <p:cNvPr id="7" name="灯片编号占位符 6">
-            <a:extLst>
-              <a:ext uri="{FF2B5EF4-FFF2-40B4-BE49-F238E27FC236}">
-                <a16:creationId xmlns:a16="http://schemas.microsoft.com/office/drawing/2014/main" id="{81F56181-A6E8-F539-1F35-706F2C4FB341}"/>
-              </a:ext>
-            </a:extLst>
-          </p:cNvPr>
+          <p:cNvPr id="7" name="灯片编号占位符 6"/>
           <p:cNvSpPr>
             <a:spLocks noGrp="1"/>
           </p:cNvSpPr>
@@ -1470,18 +1267,12 @@
           <a:p>
             <a:fld id="{85CB34D2-D757-4754-A73E-1EED158EE8DB}" type="slidenum">
               <a:rPr lang="en-US" smtClean="0"/>
-              <a:t>‹#›</a:t>
             </a:fld>
             <a:endParaRPr lang="en-US"/>
           </a:p>
         </p:txBody>
       </p:sp>
     </p:spTree>
-    <p:extLst>
-      <p:ext uri="{BB962C8B-B14F-4D97-AF65-F5344CB8AC3E}">
-        <p14:creationId xmlns:p14="http://schemas.microsoft.com/office/powerpoint/2010/main" val="4270198011"/>
-      </p:ext>
-    </p:extLst>
   </p:cSld>
   <p:clrMapOvr>
     <a:masterClrMapping/>
@@ -1508,13 +1299,7 @@
       </p:grpSpPr>
       <p:sp>
         <p:nvSpPr>
-          <p:cNvPr id="2" name="标题 1">
-            <a:extLst>
-              <a:ext uri="{FF2B5EF4-FFF2-40B4-BE49-F238E27FC236}">
-                <a16:creationId xmlns:a16="http://schemas.microsoft.com/office/drawing/2014/main" id="{0EECA6F3-D430-B8A5-12A9-627AF5916D21}"/>
-              </a:ext>
-            </a:extLst>
-          </p:cNvPr>
+          <p:cNvPr id="2" name="标题 1"/>
           <p:cNvSpPr>
             <a:spLocks noGrp="1"/>
           </p:cNvSpPr>
@@ -1542,13 +1327,7 @@
       </p:sp>
       <p:sp>
         <p:nvSpPr>
-          <p:cNvPr id="3" name="文本占位符 2">
-            <a:extLst>
-              <a:ext uri="{FF2B5EF4-FFF2-40B4-BE49-F238E27FC236}">
-                <a16:creationId xmlns:a16="http://schemas.microsoft.com/office/drawing/2014/main" id="{9E8E50FA-C632-A820-E2D5-C97C22F47D55}"/>
-              </a:ext>
-            </a:extLst>
-          </p:cNvPr>
+          <p:cNvPr id="3" name="文本占位符 2"/>
           <p:cNvSpPr>
             <a:spLocks noGrp="1"/>
           </p:cNvSpPr>
@@ -1608,18 +1387,13 @@
               <a:rPr lang="zh-CN" altLang="en-US"/>
               <a:t>单击此处编辑母版文本样式</a:t>
             </a:r>
-          </a:p>
-        </p:txBody>
-      </p:sp>
-      <p:sp>
-        <p:nvSpPr>
-          <p:cNvPr id="4" name="内容占位符 3">
-            <a:extLst>
-              <a:ext uri="{FF2B5EF4-FFF2-40B4-BE49-F238E27FC236}">
-                <a16:creationId xmlns:a16="http://schemas.microsoft.com/office/drawing/2014/main" id="{B65ACE54-643B-F4B1-90CD-C7AE70E5862D}"/>
-              </a:ext>
-            </a:extLst>
-          </p:cNvPr>
+            <a:endParaRPr lang="zh-CN" altLang="en-US"/>
+          </a:p>
+        </p:txBody>
+      </p:sp>
+      <p:sp>
+        <p:nvSpPr>
+          <p:cNvPr id="4" name="内容占位符 3"/>
           <p:cNvSpPr>
             <a:spLocks noGrp="1"/>
           </p:cNvSpPr>
@@ -1642,6 +1416,7 @@
               <a:rPr lang="zh-CN" altLang="en-US"/>
               <a:t>单击此处编辑母版文本样式</a:t>
             </a:r>
+            <a:endParaRPr lang="zh-CN" altLang="en-US"/>
           </a:p>
           <a:p>
             <a:pPr lvl="1"/>
@@ -1649,6 +1424,7 @@
               <a:rPr lang="zh-CN" altLang="en-US"/>
               <a:t>二级</a:t>
             </a:r>
+            <a:endParaRPr lang="zh-CN" altLang="en-US"/>
           </a:p>
           <a:p>
             <a:pPr lvl="2"/>
@@ -1656,6 +1432,7 @@
               <a:rPr lang="zh-CN" altLang="en-US"/>
               <a:t>三级</a:t>
             </a:r>
+            <a:endParaRPr lang="zh-CN" altLang="en-US"/>
           </a:p>
           <a:p>
             <a:pPr lvl="3"/>
@@ -1663,6 +1440,7 @@
               <a:rPr lang="zh-CN" altLang="en-US"/>
               <a:t>四级</a:t>
             </a:r>
+            <a:endParaRPr lang="zh-CN" altLang="en-US"/>
           </a:p>
           <a:p>
             <a:pPr lvl="4"/>
@@ -1676,13 +1454,7 @@
       </p:sp>
       <p:sp>
         <p:nvSpPr>
-          <p:cNvPr id="5" name="文本占位符 4">
-            <a:extLst>
-              <a:ext uri="{FF2B5EF4-FFF2-40B4-BE49-F238E27FC236}">
-                <a16:creationId xmlns:a16="http://schemas.microsoft.com/office/drawing/2014/main" id="{0B43A248-230D-2C9D-6612-2BE2B46121AC}"/>
-              </a:ext>
-            </a:extLst>
-          </p:cNvPr>
+          <p:cNvPr id="5" name="文本占位符 4"/>
           <p:cNvSpPr>
             <a:spLocks noGrp="1"/>
           </p:cNvSpPr>
@@ -1742,18 +1514,13 @@
               <a:rPr lang="zh-CN" altLang="en-US"/>
               <a:t>单击此处编辑母版文本样式</a:t>
             </a:r>
-          </a:p>
-        </p:txBody>
-      </p:sp>
-      <p:sp>
-        <p:nvSpPr>
-          <p:cNvPr id="6" name="内容占位符 5">
-            <a:extLst>
-              <a:ext uri="{FF2B5EF4-FFF2-40B4-BE49-F238E27FC236}">
-                <a16:creationId xmlns:a16="http://schemas.microsoft.com/office/drawing/2014/main" id="{6718F48F-A9D0-EFCC-5FE3-99F285CA6410}"/>
-              </a:ext>
-            </a:extLst>
-          </p:cNvPr>
+            <a:endParaRPr lang="zh-CN" altLang="en-US"/>
+          </a:p>
+        </p:txBody>
+      </p:sp>
+      <p:sp>
+        <p:nvSpPr>
+          <p:cNvPr id="6" name="内容占位符 5"/>
           <p:cNvSpPr>
             <a:spLocks noGrp="1"/>
           </p:cNvSpPr>
@@ -1776,6 +1543,7 @@
               <a:rPr lang="zh-CN" altLang="en-US"/>
               <a:t>单击此处编辑母版文本样式</a:t>
             </a:r>
+            <a:endParaRPr lang="zh-CN" altLang="en-US"/>
           </a:p>
           <a:p>
             <a:pPr lvl="1"/>
@@ -1783,6 +1551,7 @@
               <a:rPr lang="zh-CN" altLang="en-US"/>
               <a:t>二级</a:t>
             </a:r>
+            <a:endParaRPr lang="zh-CN" altLang="en-US"/>
           </a:p>
           <a:p>
             <a:pPr lvl="2"/>
@@ -1790,6 +1559,7 @@
               <a:rPr lang="zh-CN" altLang="en-US"/>
               <a:t>三级</a:t>
             </a:r>
+            <a:endParaRPr lang="zh-CN" altLang="en-US"/>
           </a:p>
           <a:p>
             <a:pPr lvl="3"/>
@@ -1797,6 +1567,7 @@
               <a:rPr lang="zh-CN" altLang="en-US"/>
               <a:t>四级</a:t>
             </a:r>
+            <a:endParaRPr lang="zh-CN" altLang="en-US"/>
           </a:p>
           <a:p>
             <a:pPr lvl="4"/>
@@ -1810,13 +1581,7 @@
       </p:sp>
       <p:sp>
         <p:nvSpPr>
-          <p:cNvPr id="7" name="日期占位符 6">
-            <a:extLst>
-              <a:ext uri="{FF2B5EF4-FFF2-40B4-BE49-F238E27FC236}">
-                <a16:creationId xmlns:a16="http://schemas.microsoft.com/office/drawing/2014/main" id="{3E6526DE-00D1-75EB-B16D-DC0388C225A7}"/>
-              </a:ext>
-            </a:extLst>
-          </p:cNvPr>
+          <p:cNvPr id="7" name="日期占位符 6"/>
           <p:cNvSpPr>
             <a:spLocks noGrp="1"/>
           </p:cNvSpPr>
@@ -1831,7 +1596,6 @@
           <a:p>
             <a:fld id="{867BD015-EE8C-4392-AE99-E743ABF6B72E}" type="datetimeFigureOut">
               <a:rPr lang="en-US" smtClean="0"/>
-              <a:t>3/15/2023</a:t>
             </a:fld>
             <a:endParaRPr lang="en-US"/>
           </a:p>
@@ -1839,13 +1603,7 @@
       </p:sp>
       <p:sp>
         <p:nvSpPr>
-          <p:cNvPr id="8" name="页脚占位符 7">
-            <a:extLst>
-              <a:ext uri="{FF2B5EF4-FFF2-40B4-BE49-F238E27FC236}">
-                <a16:creationId xmlns:a16="http://schemas.microsoft.com/office/drawing/2014/main" id="{F8C27224-DDAA-16FD-803B-9E8F291BC20D}"/>
-              </a:ext>
-            </a:extLst>
-          </p:cNvPr>
+          <p:cNvPr id="8" name="页脚占位符 7"/>
           <p:cNvSpPr>
             <a:spLocks noGrp="1"/>
           </p:cNvSpPr>
@@ -1864,13 +1622,7 @@
       </p:sp>
       <p:sp>
         <p:nvSpPr>
-          <p:cNvPr id="9" name="灯片编号占位符 8">
-            <a:extLst>
-              <a:ext uri="{FF2B5EF4-FFF2-40B4-BE49-F238E27FC236}">
-                <a16:creationId xmlns:a16="http://schemas.microsoft.com/office/drawing/2014/main" id="{0BD7575A-8D93-FFC9-A560-61F743D59067}"/>
-              </a:ext>
-            </a:extLst>
-          </p:cNvPr>
+          <p:cNvPr id="9" name="灯片编号占位符 8"/>
           <p:cNvSpPr>
             <a:spLocks noGrp="1"/>
           </p:cNvSpPr>
@@ -1885,18 +1637,12 @@
           <a:p>
             <a:fld id="{85CB34D2-D757-4754-A73E-1EED158EE8DB}" type="slidenum">
               <a:rPr lang="en-US" smtClean="0"/>
-              <a:t>‹#›</a:t>
             </a:fld>
             <a:endParaRPr lang="en-US"/>
           </a:p>
         </p:txBody>
       </p:sp>
     </p:spTree>
-    <p:extLst>
-      <p:ext uri="{BB962C8B-B14F-4D97-AF65-F5344CB8AC3E}">
-        <p14:creationId xmlns:p14="http://schemas.microsoft.com/office/powerpoint/2010/main" val="2852466980"/>
-      </p:ext>
-    </p:extLst>
   </p:cSld>
   <p:clrMapOvr>
     <a:masterClrMapping/>
@@ -1923,13 +1669,7 @@
       </p:grpSpPr>
       <p:sp>
         <p:nvSpPr>
-          <p:cNvPr id="2" name="标题 1">
-            <a:extLst>
-              <a:ext uri="{FF2B5EF4-FFF2-40B4-BE49-F238E27FC236}">
-                <a16:creationId xmlns:a16="http://schemas.microsoft.com/office/drawing/2014/main" id="{A90A0326-97BE-F050-FE31-CD4968DBB7D2}"/>
-              </a:ext>
-            </a:extLst>
-          </p:cNvPr>
+          <p:cNvPr id="2" name="标题 1"/>
           <p:cNvSpPr>
             <a:spLocks noGrp="1"/>
           </p:cNvSpPr>
@@ -1952,13 +1692,7 @@
       </p:sp>
       <p:sp>
         <p:nvSpPr>
-          <p:cNvPr id="3" name="日期占位符 2">
-            <a:extLst>
-              <a:ext uri="{FF2B5EF4-FFF2-40B4-BE49-F238E27FC236}">
-                <a16:creationId xmlns:a16="http://schemas.microsoft.com/office/drawing/2014/main" id="{A65D06A5-4F64-BF37-D55D-098DD43B62FC}"/>
-              </a:ext>
-            </a:extLst>
-          </p:cNvPr>
+          <p:cNvPr id="3" name="日期占位符 2"/>
           <p:cNvSpPr>
             <a:spLocks noGrp="1"/>
           </p:cNvSpPr>
@@ -1973,7 +1707,6 @@
           <a:p>
             <a:fld id="{867BD015-EE8C-4392-AE99-E743ABF6B72E}" type="datetimeFigureOut">
               <a:rPr lang="en-US" smtClean="0"/>
-              <a:t>3/15/2023</a:t>
             </a:fld>
             <a:endParaRPr lang="en-US"/>
           </a:p>
@@ -1981,13 +1714,7 @@
       </p:sp>
       <p:sp>
         <p:nvSpPr>
-          <p:cNvPr id="4" name="页脚占位符 3">
-            <a:extLst>
-              <a:ext uri="{FF2B5EF4-FFF2-40B4-BE49-F238E27FC236}">
-                <a16:creationId xmlns:a16="http://schemas.microsoft.com/office/drawing/2014/main" id="{AAC2AE19-0780-D41F-A66E-1DA07315A963}"/>
-              </a:ext>
-            </a:extLst>
-          </p:cNvPr>
+          <p:cNvPr id="4" name="页脚占位符 3"/>
           <p:cNvSpPr>
             <a:spLocks noGrp="1"/>
           </p:cNvSpPr>
@@ -2006,13 +1733,7 @@
       </p:sp>
       <p:sp>
         <p:nvSpPr>
-          <p:cNvPr id="5" name="灯片编号占位符 4">
-            <a:extLst>
-              <a:ext uri="{FF2B5EF4-FFF2-40B4-BE49-F238E27FC236}">
-                <a16:creationId xmlns:a16="http://schemas.microsoft.com/office/drawing/2014/main" id="{8C789ACE-4A6A-9418-25C5-11D789978086}"/>
-              </a:ext>
-            </a:extLst>
-          </p:cNvPr>
+          <p:cNvPr id="5" name="灯片编号占位符 4"/>
           <p:cNvSpPr>
             <a:spLocks noGrp="1"/>
           </p:cNvSpPr>
@@ -2027,18 +1748,12 @@
           <a:p>
             <a:fld id="{85CB34D2-D757-4754-A73E-1EED158EE8DB}" type="slidenum">
               <a:rPr lang="en-US" smtClean="0"/>
-              <a:t>‹#›</a:t>
             </a:fld>
             <a:endParaRPr lang="en-US"/>
           </a:p>
         </p:txBody>
       </p:sp>
     </p:spTree>
-    <p:extLst>
-      <p:ext uri="{BB962C8B-B14F-4D97-AF65-F5344CB8AC3E}">
-        <p14:creationId xmlns:p14="http://schemas.microsoft.com/office/powerpoint/2010/main" val="2704383633"/>
-      </p:ext>
-    </p:extLst>
   </p:cSld>
   <p:clrMapOvr>
     <a:masterClrMapping/>
@@ -2065,13 +1780,7 @@
       </p:grpSpPr>
       <p:sp>
         <p:nvSpPr>
-          <p:cNvPr id="2" name="日期占位符 1">
-            <a:extLst>
-              <a:ext uri="{FF2B5EF4-FFF2-40B4-BE49-F238E27FC236}">
-                <a16:creationId xmlns:a16="http://schemas.microsoft.com/office/drawing/2014/main" id="{A1BAADA8-5735-5883-1D65-E9746692C34B}"/>
-              </a:ext>
-            </a:extLst>
-          </p:cNvPr>
+          <p:cNvPr id="2" name="日期占位符 1"/>
           <p:cNvSpPr>
             <a:spLocks noGrp="1"/>
           </p:cNvSpPr>
@@ -2086,7 +1795,6 @@
           <a:p>
             <a:fld id="{867BD015-EE8C-4392-AE99-E743ABF6B72E}" type="datetimeFigureOut">
               <a:rPr lang="en-US" smtClean="0"/>
-              <a:t>3/15/2023</a:t>
             </a:fld>
             <a:endParaRPr lang="en-US"/>
           </a:p>
@@ -2094,13 +1802,7 @@
       </p:sp>
       <p:sp>
         <p:nvSpPr>
-          <p:cNvPr id="3" name="页脚占位符 2">
-            <a:extLst>
-              <a:ext uri="{FF2B5EF4-FFF2-40B4-BE49-F238E27FC236}">
-                <a16:creationId xmlns:a16="http://schemas.microsoft.com/office/drawing/2014/main" id="{9D63A780-B77E-FF07-2676-00C0A2FED70C}"/>
-              </a:ext>
-            </a:extLst>
-          </p:cNvPr>
+          <p:cNvPr id="3" name="页脚占位符 2"/>
           <p:cNvSpPr>
             <a:spLocks noGrp="1"/>
           </p:cNvSpPr>
@@ -2119,13 +1821,7 @@
       </p:sp>
       <p:sp>
         <p:nvSpPr>
-          <p:cNvPr id="4" name="灯片编号占位符 3">
-            <a:extLst>
-              <a:ext uri="{FF2B5EF4-FFF2-40B4-BE49-F238E27FC236}">
-                <a16:creationId xmlns:a16="http://schemas.microsoft.com/office/drawing/2014/main" id="{916F74F7-6ADD-77E3-2E85-7C22E2EABA9D}"/>
-              </a:ext>
-            </a:extLst>
-          </p:cNvPr>
+          <p:cNvPr id="4" name="灯片编号占位符 3"/>
           <p:cNvSpPr>
             <a:spLocks noGrp="1"/>
           </p:cNvSpPr>
@@ -2140,18 +1836,12 @@
           <a:p>
             <a:fld id="{85CB34D2-D757-4754-A73E-1EED158EE8DB}" type="slidenum">
               <a:rPr lang="en-US" smtClean="0"/>
-              <a:t>‹#›</a:t>
             </a:fld>
             <a:endParaRPr lang="en-US"/>
           </a:p>
         </p:txBody>
       </p:sp>
     </p:spTree>
-    <p:extLst>
-      <p:ext uri="{BB962C8B-B14F-4D97-AF65-F5344CB8AC3E}">
-        <p14:creationId xmlns:p14="http://schemas.microsoft.com/office/powerpoint/2010/main" val="2465281610"/>
-      </p:ext>
-    </p:extLst>
   </p:cSld>
   <p:clrMapOvr>
     <a:masterClrMapping/>
@@ -2178,13 +1868,7 @@
       </p:grpSpPr>
       <p:sp>
         <p:nvSpPr>
-          <p:cNvPr id="2" name="标题 1">
-            <a:extLst>
-              <a:ext uri="{FF2B5EF4-FFF2-40B4-BE49-F238E27FC236}">
-                <a16:creationId xmlns:a16="http://schemas.microsoft.com/office/drawing/2014/main" id="{2BF69C15-D6A6-71B0-873E-1C86A22FDE04}"/>
-              </a:ext>
-            </a:extLst>
-          </p:cNvPr>
+          <p:cNvPr id="2" name="标题 1"/>
           <p:cNvSpPr>
             <a:spLocks noGrp="1"/>
           </p:cNvSpPr>
@@ -2216,13 +1900,7 @@
       </p:sp>
       <p:sp>
         <p:nvSpPr>
-          <p:cNvPr id="3" name="内容占位符 2">
-            <a:extLst>
-              <a:ext uri="{FF2B5EF4-FFF2-40B4-BE49-F238E27FC236}">
-                <a16:creationId xmlns:a16="http://schemas.microsoft.com/office/drawing/2014/main" id="{F3A99B3B-CBEF-10AD-3C75-CAB52425364D}"/>
-              </a:ext>
-            </a:extLst>
-          </p:cNvPr>
+          <p:cNvPr id="3" name="内容占位符 2"/>
           <p:cNvSpPr>
             <a:spLocks noGrp="1"/>
           </p:cNvSpPr>
@@ -2273,6 +1951,7 @@
               <a:rPr lang="zh-CN" altLang="en-US"/>
               <a:t>单击此处编辑母版文本样式</a:t>
             </a:r>
+            <a:endParaRPr lang="zh-CN" altLang="en-US"/>
           </a:p>
           <a:p>
             <a:pPr lvl="1"/>
@@ -2280,6 +1959,7 @@
               <a:rPr lang="zh-CN" altLang="en-US"/>
               <a:t>二级</a:t>
             </a:r>
+            <a:endParaRPr lang="zh-CN" altLang="en-US"/>
           </a:p>
           <a:p>
             <a:pPr lvl="2"/>
@@ -2287,6 +1967,7 @@
               <a:rPr lang="zh-CN" altLang="en-US"/>
               <a:t>三级</a:t>
             </a:r>
+            <a:endParaRPr lang="zh-CN" altLang="en-US"/>
           </a:p>
           <a:p>
             <a:pPr lvl="3"/>
@@ -2294,6 +1975,7 @@
               <a:rPr lang="zh-CN" altLang="en-US"/>
               <a:t>四级</a:t>
             </a:r>
+            <a:endParaRPr lang="zh-CN" altLang="en-US"/>
           </a:p>
           <a:p>
             <a:pPr lvl="4"/>
@@ -2307,13 +1989,7 @@
       </p:sp>
       <p:sp>
         <p:nvSpPr>
-          <p:cNvPr id="4" name="文本占位符 3">
-            <a:extLst>
-              <a:ext uri="{FF2B5EF4-FFF2-40B4-BE49-F238E27FC236}">
-                <a16:creationId xmlns:a16="http://schemas.microsoft.com/office/drawing/2014/main" id="{1D932C25-6322-0D99-EB83-C121AC4ED26A}"/>
-              </a:ext>
-            </a:extLst>
-          </p:cNvPr>
+          <p:cNvPr id="4" name="文本占位符 3"/>
           <p:cNvSpPr>
             <a:spLocks noGrp="1"/>
           </p:cNvSpPr>
@@ -2373,18 +2049,13 @@
               <a:rPr lang="zh-CN" altLang="en-US"/>
               <a:t>单击此处编辑母版文本样式</a:t>
             </a:r>
-          </a:p>
-        </p:txBody>
-      </p:sp>
-      <p:sp>
-        <p:nvSpPr>
-          <p:cNvPr id="5" name="日期占位符 4">
-            <a:extLst>
-              <a:ext uri="{FF2B5EF4-FFF2-40B4-BE49-F238E27FC236}">
-                <a16:creationId xmlns:a16="http://schemas.microsoft.com/office/drawing/2014/main" id="{ABAA3970-BF07-78A4-C042-D2481587AB93}"/>
-              </a:ext>
-            </a:extLst>
-          </p:cNvPr>
+            <a:endParaRPr lang="zh-CN" altLang="en-US"/>
+          </a:p>
+        </p:txBody>
+      </p:sp>
+      <p:sp>
+        <p:nvSpPr>
+          <p:cNvPr id="5" name="日期占位符 4"/>
           <p:cNvSpPr>
             <a:spLocks noGrp="1"/>
           </p:cNvSpPr>
@@ -2399,7 +2070,6 @@
           <a:p>
             <a:fld id="{867BD015-EE8C-4392-AE99-E743ABF6B72E}" type="datetimeFigureOut">
               <a:rPr lang="en-US" smtClean="0"/>
-              <a:t>3/15/2023</a:t>
             </a:fld>
             <a:endParaRPr lang="en-US"/>
           </a:p>
@@ -2407,13 +2077,7 @@
       </p:sp>
       <p:sp>
         <p:nvSpPr>
-          <p:cNvPr id="6" name="页脚占位符 5">
-            <a:extLst>
-              <a:ext uri="{FF2B5EF4-FFF2-40B4-BE49-F238E27FC236}">
-                <a16:creationId xmlns:a16="http://schemas.microsoft.com/office/drawing/2014/main" id="{52BEA083-386E-7F33-8135-1C5561B62BAD}"/>
-              </a:ext>
-            </a:extLst>
-          </p:cNvPr>
+          <p:cNvPr id="6" name="页脚占位符 5"/>
           <p:cNvSpPr>
             <a:spLocks noGrp="1"/>
           </p:cNvSpPr>
@@ -2432,13 +2096,7 @@
       </p:sp>
       <p:sp>
         <p:nvSpPr>
-          <p:cNvPr id="7" name="灯片编号占位符 6">
-            <a:extLst>
-              <a:ext uri="{FF2B5EF4-FFF2-40B4-BE49-F238E27FC236}">
-                <a16:creationId xmlns:a16="http://schemas.microsoft.com/office/drawing/2014/main" id="{686280AE-AA30-FB8F-51B1-4A975266EBFB}"/>
-              </a:ext>
-            </a:extLst>
-          </p:cNvPr>
+          <p:cNvPr id="7" name="灯片编号占位符 6"/>
           <p:cNvSpPr>
             <a:spLocks noGrp="1"/>
           </p:cNvSpPr>
@@ -2453,18 +2111,12 @@
           <a:p>
             <a:fld id="{85CB34D2-D757-4754-A73E-1EED158EE8DB}" type="slidenum">
               <a:rPr lang="en-US" smtClean="0"/>
-              <a:t>‹#›</a:t>
             </a:fld>
             <a:endParaRPr lang="en-US"/>
           </a:p>
         </p:txBody>
       </p:sp>
     </p:spTree>
-    <p:extLst>
-      <p:ext uri="{BB962C8B-B14F-4D97-AF65-F5344CB8AC3E}">
-        <p14:creationId xmlns:p14="http://schemas.microsoft.com/office/powerpoint/2010/main" val="128856878"/>
-      </p:ext>
-    </p:extLst>
   </p:cSld>
   <p:clrMapOvr>
     <a:masterClrMapping/>
@@ -2491,13 +2143,7 @@
       </p:grpSpPr>
       <p:sp>
         <p:nvSpPr>
-          <p:cNvPr id="2" name="标题 1">
-            <a:extLst>
-              <a:ext uri="{FF2B5EF4-FFF2-40B4-BE49-F238E27FC236}">
-                <a16:creationId xmlns:a16="http://schemas.microsoft.com/office/drawing/2014/main" id="{C86BC4DC-72C4-5353-6DB9-6D0C849AB2E8}"/>
-              </a:ext>
-            </a:extLst>
-          </p:cNvPr>
+          <p:cNvPr id="2" name="标题 1"/>
           <p:cNvSpPr>
             <a:spLocks noGrp="1"/>
           </p:cNvSpPr>
@@ -2529,13 +2175,7 @@
       </p:sp>
       <p:sp>
         <p:nvSpPr>
-          <p:cNvPr id="3" name="图片占位符 2">
-            <a:extLst>
-              <a:ext uri="{FF2B5EF4-FFF2-40B4-BE49-F238E27FC236}">
-                <a16:creationId xmlns:a16="http://schemas.microsoft.com/office/drawing/2014/main" id="{A33296C4-5FA4-87A4-2A2D-A727860477F3}"/>
-              </a:ext>
-            </a:extLst>
-          </p:cNvPr>
+          <p:cNvPr id="3" name="图片占位符 2"/>
           <p:cNvSpPr>
             <a:spLocks noGrp="1"/>
           </p:cNvSpPr>
@@ -2596,13 +2236,7 @@
       </p:sp>
       <p:sp>
         <p:nvSpPr>
-          <p:cNvPr id="4" name="文本占位符 3">
-            <a:extLst>
-              <a:ext uri="{FF2B5EF4-FFF2-40B4-BE49-F238E27FC236}">
-                <a16:creationId xmlns:a16="http://schemas.microsoft.com/office/drawing/2014/main" id="{F3C2ADA5-C094-A0EB-542D-BC6267EC4DB5}"/>
-              </a:ext>
-            </a:extLst>
-          </p:cNvPr>
+          <p:cNvPr id="4" name="文本占位符 3"/>
           <p:cNvSpPr>
             <a:spLocks noGrp="1"/>
           </p:cNvSpPr>
@@ -2662,18 +2296,13 @@
               <a:rPr lang="zh-CN" altLang="en-US"/>
               <a:t>单击此处编辑母版文本样式</a:t>
             </a:r>
-          </a:p>
-        </p:txBody>
-      </p:sp>
-      <p:sp>
-        <p:nvSpPr>
-          <p:cNvPr id="5" name="日期占位符 4">
-            <a:extLst>
-              <a:ext uri="{FF2B5EF4-FFF2-40B4-BE49-F238E27FC236}">
-                <a16:creationId xmlns:a16="http://schemas.microsoft.com/office/drawing/2014/main" id="{048F4B97-A445-5F80-C2F5-DF96125721CC}"/>
-              </a:ext>
-            </a:extLst>
-          </p:cNvPr>
+            <a:endParaRPr lang="zh-CN" altLang="en-US"/>
+          </a:p>
+        </p:txBody>
+      </p:sp>
+      <p:sp>
+        <p:nvSpPr>
+          <p:cNvPr id="5" name="日期占位符 4"/>
           <p:cNvSpPr>
             <a:spLocks noGrp="1"/>
           </p:cNvSpPr>
@@ -2688,7 +2317,6 @@
           <a:p>
             <a:fld id="{867BD015-EE8C-4392-AE99-E743ABF6B72E}" type="datetimeFigureOut">
               <a:rPr lang="en-US" smtClean="0"/>
-              <a:t>3/15/2023</a:t>
             </a:fld>
             <a:endParaRPr lang="en-US"/>
           </a:p>
@@ -2696,13 +2324,7 @@
       </p:sp>
       <p:sp>
         <p:nvSpPr>
-          <p:cNvPr id="6" name="页脚占位符 5">
-            <a:extLst>
-              <a:ext uri="{FF2B5EF4-FFF2-40B4-BE49-F238E27FC236}">
-                <a16:creationId xmlns:a16="http://schemas.microsoft.com/office/drawing/2014/main" id="{4DBDE72A-B853-BC5B-6953-9208F70B5D8F}"/>
-              </a:ext>
-            </a:extLst>
-          </p:cNvPr>
+          <p:cNvPr id="6" name="页脚占位符 5"/>
           <p:cNvSpPr>
             <a:spLocks noGrp="1"/>
           </p:cNvSpPr>
@@ -2721,13 +2343,7 @@
       </p:sp>
       <p:sp>
         <p:nvSpPr>
-          <p:cNvPr id="7" name="灯片编号占位符 6">
-            <a:extLst>
-              <a:ext uri="{FF2B5EF4-FFF2-40B4-BE49-F238E27FC236}">
-                <a16:creationId xmlns:a16="http://schemas.microsoft.com/office/drawing/2014/main" id="{536905AA-D9DE-47CF-9BB0-551A5E1748C4}"/>
-              </a:ext>
-            </a:extLst>
-          </p:cNvPr>
+          <p:cNvPr id="7" name="灯片编号占位符 6"/>
           <p:cNvSpPr>
             <a:spLocks noGrp="1"/>
           </p:cNvSpPr>
@@ -2742,18 +2358,12 @@
           <a:p>
             <a:fld id="{85CB34D2-D757-4754-A73E-1EED158EE8DB}" type="slidenum">
               <a:rPr lang="en-US" smtClean="0"/>
-              <a:t>‹#›</a:t>
             </a:fld>
             <a:endParaRPr lang="en-US"/>
           </a:p>
         </p:txBody>
       </p:sp>
     </p:spTree>
-    <p:extLst>
-      <p:ext uri="{BB962C8B-B14F-4D97-AF65-F5344CB8AC3E}">
-        <p14:creationId xmlns:p14="http://schemas.microsoft.com/office/powerpoint/2010/main" val="2274433488"/>
-      </p:ext>
-    </p:extLst>
   </p:cSld>
   <p:clrMapOvr>
     <a:masterClrMapping/>
@@ -2785,13 +2395,7 @@
       </p:grpSpPr>
       <p:sp>
         <p:nvSpPr>
-          <p:cNvPr id="2" name="标题占位符 1">
-            <a:extLst>
-              <a:ext uri="{FF2B5EF4-FFF2-40B4-BE49-F238E27FC236}">
-                <a16:creationId xmlns:a16="http://schemas.microsoft.com/office/drawing/2014/main" id="{5732AFFC-9FBE-BD66-0405-FFD8E1DF5C19}"/>
-              </a:ext>
-            </a:extLst>
-          </p:cNvPr>
+          <p:cNvPr id="2" name="标题占位符 1"/>
           <p:cNvSpPr>
             <a:spLocks noGrp="1"/>
           </p:cNvSpPr>
@@ -2824,13 +2428,7 @@
       </p:sp>
       <p:sp>
         <p:nvSpPr>
-          <p:cNvPr id="3" name="文本占位符 2">
-            <a:extLst>
-              <a:ext uri="{FF2B5EF4-FFF2-40B4-BE49-F238E27FC236}">
-                <a16:creationId xmlns:a16="http://schemas.microsoft.com/office/drawing/2014/main" id="{68CC0DE2-E6A7-7287-E233-D335EA45E7E5}"/>
-              </a:ext>
-            </a:extLst>
-          </p:cNvPr>
+          <p:cNvPr id="3" name="文本占位符 2"/>
           <p:cNvSpPr>
             <a:spLocks noGrp="1"/>
           </p:cNvSpPr>
@@ -2858,6 +2456,7 @@
               <a:rPr lang="zh-CN" altLang="en-US"/>
               <a:t>单击此处编辑母版文本样式</a:t>
             </a:r>
+            <a:endParaRPr lang="zh-CN" altLang="en-US"/>
           </a:p>
           <a:p>
             <a:pPr lvl="1"/>
@@ -2865,6 +2464,7 @@
               <a:rPr lang="zh-CN" altLang="en-US"/>
               <a:t>二级</a:t>
             </a:r>
+            <a:endParaRPr lang="zh-CN" altLang="en-US"/>
           </a:p>
           <a:p>
             <a:pPr lvl="2"/>
@@ -2872,6 +2472,7 @@
               <a:rPr lang="zh-CN" altLang="en-US"/>
               <a:t>三级</a:t>
             </a:r>
+            <a:endParaRPr lang="zh-CN" altLang="en-US"/>
           </a:p>
           <a:p>
             <a:pPr lvl="3"/>
@@ -2879,6 +2480,7 @@
               <a:rPr lang="zh-CN" altLang="en-US"/>
               <a:t>四级</a:t>
             </a:r>
+            <a:endParaRPr lang="zh-CN" altLang="en-US"/>
           </a:p>
           <a:p>
             <a:pPr lvl="4"/>
@@ -2892,13 +2494,7 @@
       </p:sp>
       <p:sp>
         <p:nvSpPr>
-          <p:cNvPr id="4" name="日期占位符 3">
-            <a:extLst>
-              <a:ext uri="{FF2B5EF4-FFF2-40B4-BE49-F238E27FC236}">
-                <a16:creationId xmlns:a16="http://schemas.microsoft.com/office/drawing/2014/main" id="{54CC7445-21E4-6EF2-9067-BB49F68B805A}"/>
-              </a:ext>
-            </a:extLst>
-          </p:cNvPr>
+          <p:cNvPr id="4" name="日期占位符 3"/>
           <p:cNvSpPr>
             <a:spLocks noGrp="1"/>
           </p:cNvSpPr>
@@ -2931,7 +2527,6 @@
           <a:p>
             <a:fld id="{867BD015-EE8C-4392-AE99-E743ABF6B72E}" type="datetimeFigureOut">
               <a:rPr lang="en-US" smtClean="0"/>
-              <a:t>3/15/2023</a:t>
             </a:fld>
             <a:endParaRPr lang="en-US"/>
           </a:p>
@@ -2939,13 +2534,7 @@
       </p:sp>
       <p:sp>
         <p:nvSpPr>
-          <p:cNvPr id="5" name="页脚占位符 4">
-            <a:extLst>
-              <a:ext uri="{FF2B5EF4-FFF2-40B4-BE49-F238E27FC236}">
-                <a16:creationId xmlns:a16="http://schemas.microsoft.com/office/drawing/2014/main" id="{6169AC86-15AD-300B-A365-C0A67C87A86A}"/>
-              </a:ext>
-            </a:extLst>
-          </p:cNvPr>
+          <p:cNvPr id="5" name="页脚占位符 4"/>
           <p:cNvSpPr>
             <a:spLocks noGrp="1"/>
           </p:cNvSpPr>
@@ -2982,13 +2571,7 @@
       </p:sp>
       <p:sp>
         <p:nvSpPr>
-          <p:cNvPr id="6" name="灯片编号占位符 5">
-            <a:extLst>
-              <a:ext uri="{FF2B5EF4-FFF2-40B4-BE49-F238E27FC236}">
-                <a16:creationId xmlns:a16="http://schemas.microsoft.com/office/drawing/2014/main" id="{90F1698E-E4C4-0035-A138-F4D97937A042}"/>
-              </a:ext>
-            </a:extLst>
-          </p:cNvPr>
+          <p:cNvPr id="6" name="灯片编号占位符 5"/>
           <p:cNvSpPr>
             <a:spLocks noGrp="1"/>
           </p:cNvSpPr>
@@ -3021,18 +2604,12 @@
           <a:p>
             <a:fld id="{85CB34D2-D757-4754-A73E-1EED158EE8DB}" type="slidenum">
               <a:rPr lang="en-US" smtClean="0"/>
-              <a:t>‹#›</a:t>
             </a:fld>
             <a:endParaRPr lang="en-US"/>
           </a:p>
         </p:txBody>
       </p:sp>
     </p:spTree>
-    <p:extLst>
-      <p:ext uri="{BB962C8B-B14F-4D97-AF65-F5344CB8AC3E}">
-        <p14:creationId xmlns:p14="http://schemas.microsoft.com/office/powerpoint/2010/main" val="560572946"/>
-      </p:ext>
-    </p:extLst>
   </p:cSld>
   <p:clrMap bg1="lt1" tx1="dk1" bg2="lt2" tx2="dk2" accent1="accent1" accent2="accent2" accent3="accent3" accent4="accent4" accent5="accent5" accent6="accent6" hlink="hlink" folHlink="folHlink"/>
   <p:sldLayoutIdLst>
@@ -3350,20 +2927,14 @@
       </p:grpSpPr>
       <p:pic>
         <p:nvPicPr>
-          <p:cNvPr id="5" name="图片 4">
-            <a:extLst>
-              <a:ext uri="{FF2B5EF4-FFF2-40B4-BE49-F238E27FC236}">
-                <a16:creationId xmlns:a16="http://schemas.microsoft.com/office/drawing/2014/main" id="{9A766CBD-A74E-8422-C7A0-890329285107}"/>
-              </a:ext>
-            </a:extLst>
-          </p:cNvPr>
+          <p:cNvPr id="5" name="图片 4"/>
           <p:cNvPicPr>
             <a:picLocks noChangeAspect="1"/>
           </p:cNvPicPr>
           <p:nvPr/>
         </p:nvPicPr>
         <p:blipFill>
-          <a:blip r:embed="rId2">
+          <a:blip r:embed="rId1">
             <a:extLst>
               <a:ext uri="{28A0092B-C50C-407E-A947-70E740481C1C}">
                 <a14:useLocalDpi xmlns:a14="http://schemas.microsoft.com/office/drawing/2010/main" val="0"/>
@@ -3386,13 +2957,7 @@
       </p:pic>
       <p:sp>
         <p:nvSpPr>
-          <p:cNvPr id="6" name="文本框 5">
-            <a:extLst>
-              <a:ext uri="{FF2B5EF4-FFF2-40B4-BE49-F238E27FC236}">
-                <a16:creationId xmlns:a16="http://schemas.microsoft.com/office/drawing/2014/main" id="{2C43FCE8-B80B-9C95-AFBD-6DD0444CE2C3}"/>
-              </a:ext>
-            </a:extLst>
-          </p:cNvPr>
+          <p:cNvPr id="6" name="文本框 5"/>
           <p:cNvSpPr txBox="1"/>
           <p:nvPr/>
         </p:nvSpPr>
@@ -3470,6 +3035,12 @@
               </a:rPr>
               <a:t> C906 CPU@600MHz, Support Vector 0.7</a:t>
             </a:r>
+            <a:endParaRPr lang="en-US" sz="1800" b="0" i="0" u="none" strike="noStrike" baseline="0" dirty="0">
+              <a:solidFill>
+                <a:srgbClr val="000000"/>
+              </a:solidFill>
+              <a:latin typeface="Calibri" panose="020F0502020204030204" pitchFamily="34" charset="0"/>
+            </a:endParaRPr>
           </a:p>
           <a:p>
             <a:pPr marL="285750" indent="-285750">
@@ -3521,6 +3092,12 @@
               </a:rPr>
               <a:t>40MHz</a:t>
             </a:r>
+            <a:endParaRPr lang="en-US" sz="1800" b="0" i="0" u="none" strike="noStrike" baseline="0" dirty="0">
+              <a:solidFill>
+                <a:srgbClr val="000000"/>
+              </a:solidFill>
+              <a:latin typeface="Calibri" panose="020F0502020204030204" pitchFamily="34" charset="0"/>
+            </a:endParaRPr>
           </a:p>
           <a:p>
             <a:pPr marL="285750" indent="-285750">
@@ -3572,6 +3149,12 @@
               </a:rPr>
               <a:t>400MHz</a:t>
             </a:r>
+            <a:endParaRPr lang="en-US" sz="1800" b="0" i="0" u="none" strike="noStrike" baseline="0" dirty="0">
+              <a:solidFill>
+                <a:srgbClr val="000000"/>
+              </a:solidFill>
+              <a:latin typeface="Calibri" panose="020F0502020204030204" pitchFamily="34" charset="0"/>
+            </a:endParaRPr>
           </a:p>
           <a:p>
             <a:pPr marL="285750" indent="-285750">
@@ -3599,6 +3182,12 @@
               </a:rPr>
               <a:t>1MB SRAM</a:t>
             </a:r>
+            <a:endParaRPr lang="en-US" dirty="0">
+              <a:solidFill>
+                <a:srgbClr val="000000"/>
+              </a:solidFill>
+              <a:latin typeface="Calibri" panose="020F0502020204030204" pitchFamily="34" charset="0"/>
+            </a:endParaRPr>
           </a:p>
           <a:p>
             <a:pPr marL="285750" indent="-285750">
@@ -3650,6 +3239,12 @@
               </a:rPr>
               <a:t>HS_PSRAM@800MHz</a:t>
             </a:r>
+            <a:endParaRPr lang="en-US" sz="1800" b="0" i="0" u="none" strike="noStrike" baseline="0" dirty="0">
+              <a:solidFill>
+                <a:srgbClr val="000000"/>
+              </a:solidFill>
+              <a:latin typeface="Calibri" panose="020F0502020204030204" pitchFamily="34" charset="0"/>
+            </a:endParaRPr>
           </a:p>
           <a:p>
             <a:pPr marL="285750" indent="-285750">
@@ -3683,6 +3278,12 @@
               </a:rPr>
               <a:t> OSPI  LS_PSRAM@AHB Clock with DMA</a:t>
             </a:r>
+            <a:endParaRPr lang="en-US" dirty="0">
+              <a:solidFill>
+                <a:srgbClr val="000000"/>
+              </a:solidFill>
+              <a:latin typeface="Calibri" panose="020F0502020204030204" pitchFamily="34" charset="0"/>
+            </a:endParaRPr>
           </a:p>
           <a:p>
             <a:pPr marL="285750" indent="-285750">
@@ -3698,6 +3299,12 @@
               </a:rPr>
               <a:t>128MB QSPI NAND</a:t>
             </a:r>
+            <a:endParaRPr lang="en-US" altLang="zh-CN" dirty="0">
+              <a:solidFill>
+                <a:srgbClr val="000000"/>
+              </a:solidFill>
+              <a:latin typeface="Calibri" panose="020F0502020204030204" pitchFamily="34" charset="0"/>
+            </a:endParaRPr>
           </a:p>
           <a:p>
             <a:endParaRPr lang="en-US" altLang="zh-CN" dirty="0">
@@ -3721,6 +3328,12 @@
               </a:rPr>
               <a:t>RGB666, i8080, BT656, SPI Display up to 1024x768@60fps</a:t>
             </a:r>
+            <a:endParaRPr lang="en-US" sz="1800" b="0" i="0" u="none" strike="noStrike" baseline="0" dirty="0">
+              <a:solidFill>
+                <a:srgbClr val="000000"/>
+              </a:solidFill>
+              <a:latin typeface="Calibri" panose="020F0502020204030204" pitchFamily="34" charset="0"/>
+            </a:endParaRPr>
           </a:p>
           <a:p>
             <a:pPr marL="285750" indent="-285750">
@@ -3766,6 +3379,12 @@
               </a:rPr>
               <a:t>1920*1088, JPEG encoding 1920*1088, 1024x768@40fps</a:t>
             </a:r>
+            <a:endParaRPr lang="en-US" sz="1800" b="0" i="0" u="none" strike="noStrike" baseline="0" dirty="0">
+              <a:solidFill>
+                <a:srgbClr val="000000"/>
+              </a:solidFill>
+              <a:latin typeface="Calibri" panose="020F0502020204030204" pitchFamily="34" charset="0"/>
+            </a:endParaRPr>
           </a:p>
           <a:p>
             <a:pPr marL="285750" indent="-285750">
@@ -3793,6 +3412,12 @@
               </a:rPr>
               <a:t>3 Audio ADC, 24Bit, 8kHz-96kHz</a:t>
             </a:r>
+            <a:endParaRPr lang="en-US" sz="1800" b="0" i="0" u="none" strike="noStrike" baseline="0" dirty="0">
+              <a:solidFill>
+                <a:srgbClr val="000000"/>
+              </a:solidFill>
+              <a:latin typeface="Calibri" panose="020F0502020204030204" pitchFamily="34" charset="0"/>
+            </a:endParaRPr>
           </a:p>
           <a:p>
             <a:pPr marL="285750" indent="-285750">
@@ -3808,6 +3433,12 @@
               </a:rPr>
               <a:t>1 Audio DAC, 24Bit, 8kHz-384kHZ</a:t>
             </a:r>
+            <a:endParaRPr lang="en-US" dirty="0">
+              <a:solidFill>
+                <a:srgbClr val="000000"/>
+              </a:solidFill>
+              <a:latin typeface="Calibri" panose="020F0502020204030204" pitchFamily="34" charset="0"/>
+            </a:endParaRPr>
           </a:p>
           <a:p>
             <a:pPr marL="285750" indent="-285750">
@@ -3844,6 +3475,12 @@
               </a:rPr>
               <a:t>OTG</a:t>
             </a:r>
+            <a:endParaRPr lang="en-US" dirty="0">
+              <a:solidFill>
+                <a:srgbClr val="000000"/>
+              </a:solidFill>
+              <a:latin typeface="Calibri" panose="020F0502020204030204" pitchFamily="34" charset="0"/>
+            </a:endParaRPr>
           </a:p>
           <a:p>
             <a:pPr marL="285750" indent="-285750">
@@ -3859,6 +3496,12 @@
               </a:rPr>
               <a:t>3 * UART, 2 * SPI, 2 * TWI, 8 * PWM, 1 * 12Bit 10 Channels ADC</a:t>
             </a:r>
+            <a:endParaRPr lang="en-US" sz="1800" b="0" i="0" u="none" strike="noStrike" baseline="0" dirty="0">
+              <a:solidFill>
+                <a:srgbClr val="000000"/>
+              </a:solidFill>
+              <a:latin typeface="Calibri" panose="020F0502020204030204" pitchFamily="34" charset="0"/>
+            </a:endParaRPr>
           </a:p>
           <a:p>
             <a:pPr marL="285750" indent="-285750">
@@ -3874,6 +3517,12 @@
               </a:rPr>
               <a:t>IR TX/RX, LEDC up to 1024 * WS2812</a:t>
             </a:r>
+            <a:endParaRPr lang="en-US" dirty="0">
+              <a:solidFill>
+                <a:srgbClr val="000000"/>
+              </a:solidFill>
+              <a:latin typeface="Calibri" panose="020F0502020204030204" pitchFamily="34" charset="0"/>
+            </a:endParaRPr>
           </a:p>
           <a:p>
             <a:pPr marL="285750" indent="-285750">
@@ -3919,6 +3568,12 @@
               </a:rPr>
               <a:t>Compatible with IEEE 802.11 b/g/n 2.4GHz</a:t>
             </a:r>
+            <a:endParaRPr lang="en-US" sz="1800" b="0" i="0" u="none" strike="noStrike" baseline="0" dirty="0">
+              <a:solidFill>
+                <a:srgbClr val="000000"/>
+              </a:solidFill>
+              <a:latin typeface="Calibri" panose="020F0502020204030204" pitchFamily="34" charset="0"/>
+            </a:endParaRPr>
           </a:p>
           <a:p>
             <a:pPr marL="285750" indent="-285750">
@@ -3961,6 +3616,12 @@
               </a:rPr>
               <a:t>EDR</a:t>
             </a:r>
+            <a:endParaRPr lang="en-US" sz="1800" b="0" i="0" u="none" strike="noStrike" baseline="0" dirty="0">
+              <a:solidFill>
+                <a:srgbClr val="000000"/>
+              </a:solidFill>
+              <a:latin typeface="Calibri" panose="020F0502020204030204" pitchFamily="34" charset="0"/>
+            </a:endParaRPr>
           </a:p>
           <a:p>
             <a:pPr marL="285750" indent="-285750">
@@ -4006,6 +3667,12 @@
               </a:rPr>
               <a:t>ompatible Pinout</a:t>
             </a:r>
+            <a:endParaRPr lang="en-US" sz="1800" b="0" i="0" u="none" strike="noStrike" baseline="0" dirty="0">
+              <a:solidFill>
+                <a:srgbClr val="000000"/>
+              </a:solidFill>
+              <a:latin typeface="Calibri" panose="020F0502020204030204" pitchFamily="34" charset="0"/>
+            </a:endParaRPr>
           </a:p>
           <a:p>
             <a:endParaRPr lang="en-US" dirty="0">
@@ -4018,11 +3685,6 @@
         </p:txBody>
       </p:sp>
     </p:spTree>
-    <p:extLst>
-      <p:ext uri="{BB962C8B-B14F-4D97-AF65-F5344CB8AC3E}">
-        <p14:creationId xmlns:p14="http://schemas.microsoft.com/office/powerpoint/2010/main" val="699219808"/>
-      </p:ext>
-    </p:extLst>
   </p:cSld>
   <p:clrMapOvr>
     <a:masterClrMapping/>
@@ -4049,20 +3711,14 @@
       </p:grpSpPr>
       <p:sp>
         <p:nvSpPr>
-          <p:cNvPr id="6" name="文本框 5">
-            <a:extLst>
-              <a:ext uri="{FF2B5EF4-FFF2-40B4-BE49-F238E27FC236}">
-                <a16:creationId xmlns:a16="http://schemas.microsoft.com/office/drawing/2014/main" id="{2C43FCE8-B80B-9C95-AFBD-6DD0444CE2C3}"/>
-              </a:ext>
-            </a:extLst>
-          </p:cNvPr>
+          <p:cNvPr id="6" name="文本框 5"/>
           <p:cNvSpPr txBox="1"/>
           <p:nvPr/>
         </p:nvSpPr>
         <p:spPr>
           <a:xfrm>
             <a:off x="4532850" y="63122"/>
-            <a:ext cx="7659150" cy="7017306"/>
+            <a:ext cx="7659150" cy="7016115"/>
           </a:xfrm>
           <a:prstGeom prst="rect">
             <a:avLst/>
@@ -4131,8 +3787,14 @@
                 </a:solidFill>
                 <a:latin typeface="Calibri" panose="020F0502020204030204" pitchFamily="34" charset="0"/>
               </a:rPr>
-              <a:t> C906 CPU@600MHz, Support Vector 0.7</a:t>
-            </a:r>
+              <a:t> C906 CPU up to 600MHz, Support Vector 0.7</a:t>
+            </a:r>
+            <a:endParaRPr lang="en-US" sz="1800" b="0" i="0" u="none" strike="noStrike" baseline="0" dirty="0">
+              <a:solidFill>
+                <a:srgbClr val="000000"/>
+              </a:solidFill>
+              <a:latin typeface="Calibri" panose="020F0502020204030204" pitchFamily="34" charset="0"/>
+            </a:endParaRPr>
           </a:p>
           <a:p>
             <a:pPr marL="285750" indent="-285750">
@@ -4164,7 +3826,7 @@
                 </a:solidFill>
                 <a:latin typeface="Calibri" panose="020F0502020204030204" pitchFamily="34" charset="0"/>
               </a:rPr>
-              <a:t>M33 Star MCU</a:t>
+              <a:t>M33 Star MCU </a:t>
             </a:r>
             <a:r>
               <a:rPr lang="en-US" dirty="0">
@@ -4172,8 +3834,18 @@
                   <a:srgbClr val="000000"/>
                 </a:solidFill>
                 <a:latin typeface="Calibri" panose="020F0502020204030204" pitchFamily="34" charset="0"/>
-              </a:rPr>
-              <a:t>@2</a:t>
+                <a:sym typeface="+mn-ea"/>
+              </a:rPr>
+              <a:t>up to </a:t>
+            </a:r>
+            <a:r>
+              <a:rPr lang="en-US" dirty="0">
+                <a:solidFill>
+                  <a:srgbClr val="000000"/>
+                </a:solidFill>
+                <a:latin typeface="Calibri" panose="020F0502020204030204" pitchFamily="34" charset="0"/>
+              </a:rPr>
+              <a:t>2</a:t>
             </a:r>
             <a:r>
               <a:rPr lang="en-US" sz="1800" b="0" i="0" u="none" strike="noStrike" baseline="0" dirty="0">
@@ -4184,6 +3856,12 @@
               </a:rPr>
               <a:t>40MHz</a:t>
             </a:r>
+            <a:endParaRPr lang="en-US" sz="1800" b="0" i="0" u="none" strike="noStrike" baseline="0" dirty="0">
+              <a:solidFill>
+                <a:srgbClr val="000000"/>
+              </a:solidFill>
+              <a:latin typeface="Calibri" panose="020F0502020204030204" pitchFamily="34" charset="0"/>
+            </a:endParaRPr>
           </a:p>
           <a:p>
             <a:pPr marL="285750" indent="-285750">
@@ -4215,7 +3893,7 @@
                 </a:solidFill>
                 <a:latin typeface="Calibri" panose="020F0502020204030204" pitchFamily="34" charset="0"/>
               </a:rPr>
-              <a:t> LX7</a:t>
+              <a:t> LX7 </a:t>
             </a:r>
             <a:r>
               <a:rPr lang="en-US" dirty="0">
@@ -4223,8 +3901,9 @@
                   <a:srgbClr val="000000"/>
                 </a:solidFill>
                 <a:latin typeface="Calibri" panose="020F0502020204030204" pitchFamily="34" charset="0"/>
-              </a:rPr>
-              <a:t>@</a:t>
+                <a:sym typeface="+mn-ea"/>
+              </a:rPr>
+              <a:t>up to </a:t>
             </a:r>
             <a:r>
               <a:rPr lang="en-US" sz="1800" b="0" i="0" u="none" strike="noStrike" baseline="0" dirty="0">
@@ -4235,6 +3914,12 @@
               </a:rPr>
               <a:t>400MHz</a:t>
             </a:r>
+            <a:endParaRPr lang="en-US" sz="1800" b="0" i="0" u="none" strike="noStrike" baseline="0" dirty="0">
+              <a:solidFill>
+                <a:srgbClr val="000000"/>
+              </a:solidFill>
+              <a:latin typeface="Calibri" panose="020F0502020204030204" pitchFamily="34" charset="0"/>
+            </a:endParaRPr>
           </a:p>
           <a:p>
             <a:pPr marL="285750" indent="-285750">
@@ -4262,6 +3947,12 @@
               </a:rPr>
               <a:t>1MB SRAM</a:t>
             </a:r>
+            <a:endParaRPr lang="en-US" dirty="0">
+              <a:solidFill>
+                <a:srgbClr val="000000"/>
+              </a:solidFill>
+              <a:latin typeface="Calibri" panose="020F0502020204030204" pitchFamily="34" charset="0"/>
+            </a:endParaRPr>
           </a:p>
           <a:p>
             <a:pPr marL="285750" indent="-285750">
@@ -4313,6 +4004,12 @@
               </a:rPr>
               <a:t>HS_PSRAM@800MHz</a:t>
             </a:r>
+            <a:endParaRPr lang="en-US" sz="1800" b="0" i="0" u="none" strike="noStrike" baseline="0" dirty="0">
+              <a:solidFill>
+                <a:srgbClr val="000000"/>
+              </a:solidFill>
+              <a:latin typeface="Calibri" panose="020F0502020204030204" pitchFamily="34" charset="0"/>
+            </a:endParaRPr>
           </a:p>
           <a:p>
             <a:pPr marL="285750" indent="-285750">
@@ -4346,6 +4043,12 @@
               </a:rPr>
               <a:t> OSPI  LS_PSRAM@AHB Clock with DMA</a:t>
             </a:r>
+            <a:endParaRPr lang="en-US" dirty="0">
+              <a:solidFill>
+                <a:srgbClr val="000000"/>
+              </a:solidFill>
+              <a:latin typeface="Calibri" panose="020F0502020204030204" pitchFamily="34" charset="0"/>
+            </a:endParaRPr>
           </a:p>
           <a:p>
             <a:pPr marL="285750" indent="-285750">
@@ -4379,6 +4082,12 @@
               </a:rPr>
               <a:t> QSPI NOR</a:t>
             </a:r>
+            <a:endParaRPr lang="en-US" altLang="zh-CN" dirty="0">
+              <a:solidFill>
+                <a:srgbClr val="000000"/>
+              </a:solidFill>
+              <a:latin typeface="Calibri" panose="020F0502020204030204" pitchFamily="34" charset="0"/>
+            </a:endParaRPr>
           </a:p>
           <a:p>
             <a:endParaRPr lang="en-US" altLang="zh-CN" dirty="0">
@@ -4402,6 +4111,12 @@
               </a:rPr>
               <a:t>RGB666, i8080, BT656, SPI Display up to 1024x768@60fps</a:t>
             </a:r>
+            <a:endParaRPr lang="en-US" sz="1800" b="0" i="0" u="none" strike="noStrike" baseline="0" dirty="0">
+              <a:solidFill>
+                <a:srgbClr val="000000"/>
+              </a:solidFill>
+              <a:latin typeface="Calibri" panose="020F0502020204030204" pitchFamily="34" charset="0"/>
+            </a:endParaRPr>
           </a:p>
           <a:p>
             <a:pPr marL="285750" indent="-285750">
@@ -4447,6 +4162,12 @@
               </a:rPr>
               <a:t>1920*1088, JPEG encoding 1920*1088, 1024x768@40fps</a:t>
             </a:r>
+            <a:endParaRPr lang="en-US" sz="1800" b="0" i="0" u="none" strike="noStrike" baseline="0" dirty="0">
+              <a:solidFill>
+                <a:srgbClr val="000000"/>
+              </a:solidFill>
+              <a:latin typeface="Calibri" panose="020F0502020204030204" pitchFamily="34" charset="0"/>
+            </a:endParaRPr>
           </a:p>
           <a:p>
             <a:pPr marL="285750" indent="-285750">
@@ -4474,6 +4195,12 @@
               </a:rPr>
               <a:t>3 Audio ADC, 24Bit, 8kHz-96kHz, Support 4 DMICs</a:t>
             </a:r>
+            <a:endParaRPr lang="en-US" sz="1800" b="0" i="0" u="none" strike="noStrike" baseline="0" dirty="0">
+              <a:solidFill>
+                <a:srgbClr val="000000"/>
+              </a:solidFill>
+              <a:latin typeface="Calibri" panose="020F0502020204030204" pitchFamily="34" charset="0"/>
+            </a:endParaRPr>
           </a:p>
           <a:p>
             <a:pPr marL="285750" indent="-285750">
@@ -4489,6 +4216,12 @@
               </a:rPr>
               <a:t>2 Audio DAC, 24Bit, 8kHz-384kHZ</a:t>
             </a:r>
+            <a:endParaRPr lang="en-US" dirty="0">
+              <a:solidFill>
+                <a:srgbClr val="000000"/>
+              </a:solidFill>
+              <a:latin typeface="Calibri" panose="020F0502020204030204" pitchFamily="34" charset="0"/>
+            </a:endParaRPr>
           </a:p>
           <a:p>
             <a:pPr marL="285750" indent="-285750">
@@ -4525,6 +4258,12 @@
               </a:rPr>
               <a:t>OTG</a:t>
             </a:r>
+            <a:endParaRPr lang="en-US" dirty="0">
+              <a:solidFill>
+                <a:srgbClr val="000000"/>
+              </a:solidFill>
+              <a:latin typeface="Calibri" panose="020F0502020204030204" pitchFamily="34" charset="0"/>
+            </a:endParaRPr>
           </a:p>
           <a:p>
             <a:pPr marL="285750" indent="-285750">
@@ -4540,6 +4279,12 @@
               </a:rPr>
               <a:t>3 * UART, 2 * SPI, 2 * TWI, 8 * PWM, 1 * 12Bit 10 Channels ADC</a:t>
             </a:r>
+            <a:endParaRPr lang="en-US" sz="1800" b="0" i="0" u="none" strike="noStrike" baseline="0" dirty="0">
+              <a:solidFill>
+                <a:srgbClr val="000000"/>
+              </a:solidFill>
+              <a:latin typeface="Calibri" panose="020F0502020204030204" pitchFamily="34" charset="0"/>
+            </a:endParaRPr>
           </a:p>
           <a:p>
             <a:pPr marL="285750" indent="-285750">
@@ -4555,6 +4300,12 @@
               </a:rPr>
               <a:t>IR TX/RX, LEDC up to 1024 * WS2812</a:t>
             </a:r>
+            <a:endParaRPr lang="en-US" dirty="0">
+              <a:solidFill>
+                <a:srgbClr val="000000"/>
+              </a:solidFill>
+              <a:latin typeface="Calibri" panose="020F0502020204030204" pitchFamily="34" charset="0"/>
+            </a:endParaRPr>
           </a:p>
           <a:p>
             <a:pPr marL="285750" indent="-285750">
@@ -4600,6 +4351,12 @@
               </a:rPr>
               <a:t>Compatible with IEEE 802.11 b/g/n 2.4GHz</a:t>
             </a:r>
+            <a:endParaRPr lang="en-US" sz="1800" b="0" i="0" u="none" strike="noStrike" baseline="0" dirty="0">
+              <a:solidFill>
+                <a:srgbClr val="000000"/>
+              </a:solidFill>
+              <a:latin typeface="Calibri" panose="020F0502020204030204" pitchFamily="34" charset="0"/>
+            </a:endParaRPr>
           </a:p>
           <a:p>
             <a:pPr marL="285750" indent="-285750">
@@ -4642,6 +4399,12 @@
               </a:rPr>
               <a:t>EDR</a:t>
             </a:r>
+            <a:endParaRPr lang="en-US" sz="1800" b="0" i="0" u="none" strike="noStrike" baseline="0" dirty="0">
+              <a:solidFill>
+                <a:srgbClr val="000000"/>
+              </a:solidFill>
+              <a:latin typeface="Calibri" panose="020F0502020204030204" pitchFamily="34" charset="0"/>
+            </a:endParaRPr>
           </a:p>
           <a:p>
             <a:pPr marL="285750" indent="-285750">
@@ -4687,6 +4450,12 @@
               </a:rPr>
               <a:t>ompatible Pinout</a:t>
             </a:r>
+            <a:endParaRPr lang="en-US" sz="1800" b="0" i="0" u="none" strike="noStrike" baseline="0" dirty="0">
+              <a:solidFill>
+                <a:srgbClr val="000000"/>
+              </a:solidFill>
+              <a:latin typeface="Calibri" panose="020F0502020204030204" pitchFamily="34" charset="0"/>
+            </a:endParaRPr>
           </a:p>
           <a:p>
             <a:endParaRPr lang="en-US" dirty="0">
@@ -4700,20 +4469,14 @@
       </p:sp>
       <p:pic>
         <p:nvPicPr>
-          <p:cNvPr id="3" name="图片 2">
-            <a:extLst>
-              <a:ext uri="{FF2B5EF4-FFF2-40B4-BE49-F238E27FC236}">
-                <a16:creationId xmlns:a16="http://schemas.microsoft.com/office/drawing/2014/main" id="{AED95F5A-EB73-F9DF-5EDE-27ECBE479C20}"/>
-              </a:ext>
-            </a:extLst>
-          </p:cNvPr>
+          <p:cNvPr id="3" name="图片 2"/>
           <p:cNvPicPr>
             <a:picLocks noChangeAspect="1"/>
           </p:cNvPicPr>
           <p:nvPr/>
         </p:nvPicPr>
         <p:blipFill>
-          <a:blip r:embed="rId2">
+          <a:blip r:embed="rId1">
             <a:extLst>
               <a:ext uri="{28A0092B-C50C-407E-A947-70E740481C1C}">
                 <a14:useLocalDpi xmlns:a14="http://schemas.microsoft.com/office/drawing/2010/main" val="0"/>
@@ -4735,16 +4498,17 @@
         </p:spPr>
       </p:pic>
     </p:spTree>
-    <p:extLst>
-      <p:ext uri="{BB962C8B-B14F-4D97-AF65-F5344CB8AC3E}">
-        <p14:creationId xmlns:p14="http://schemas.microsoft.com/office/powerpoint/2010/main" val="3848396339"/>
-      </p:ext>
-    </p:extLst>
   </p:cSld>
   <p:clrMapOvr>
     <a:masterClrMapping/>
   </p:clrMapOvr>
 </p:sld>
+</file>
+
+<file path=ppt/tags/tag1.xml><?xml version="1.0" encoding="utf-8"?>
+<p:tagLst xmlns:p="http://schemas.openxmlformats.org/presentationml/2006/main">
+  <p:tag name="COMMONDATA" val="eyJoZGlkIjoiODUyN2MyMGMxOGVjN2NmMTEyYTIyZGMzOWIxYzMwMzMifQ=="/>
+</p:tagLst>
 </file>
 
 <file path=ppt/theme/theme1.xml><?xml version="1.0" encoding="utf-8"?>
@@ -4790,7 +4554,7 @@
     </a:clrScheme>
     <a:fontScheme name="Office">
       <a:majorFont>
-        <a:latin typeface="Calibri Light" panose="020F0302020204030204"/>
+        <a:latin typeface="Calibri Light"/>
         <a:ea typeface=""/>
         <a:cs typeface=""/>
         <a:font script="Jpan" typeface="游ゴシック Light"/>
@@ -4823,26 +4587,9 @@
         <a:font script="Viet" typeface="Times New Roman"/>
         <a:font script="Uigh" typeface="Microsoft Uighur"/>
         <a:font script="Geor" typeface="Sylfaen"/>
-        <a:font script="Armn" typeface="Arial"/>
-        <a:font script="Bugi" typeface="Leelawadee UI"/>
-        <a:font script="Bopo" typeface="Microsoft JhengHei"/>
-        <a:font script="Java" typeface="Javanese Text"/>
-        <a:font script="Lisu" typeface="Segoe UI"/>
-        <a:font script="Mymr" typeface="Myanmar Text"/>
-        <a:font script="Nkoo" typeface="Ebrima"/>
-        <a:font script="Olck" typeface="Nirmala UI"/>
-        <a:font script="Osma" typeface="Ebrima"/>
-        <a:font script="Phag" typeface="Phagspa"/>
-        <a:font script="Syrn" typeface="Estrangelo Edessa"/>
-        <a:font script="Syrj" typeface="Estrangelo Edessa"/>
-        <a:font script="Syre" typeface="Estrangelo Edessa"/>
-        <a:font script="Sora" typeface="Nirmala UI"/>
-        <a:font script="Tale" typeface="Microsoft Tai Le"/>
-        <a:font script="Talu" typeface="Microsoft New Tai Lue"/>
-        <a:font script="Tfng" typeface="Ebrima"/>
       </a:majorFont>
       <a:minorFont>
-        <a:latin typeface="Calibri" panose="020F0502020204030204"/>
+        <a:latin typeface="Calibri"/>
         <a:ea typeface=""/>
         <a:cs typeface=""/>
         <a:font script="Jpan" typeface="游ゴシック"/>
@@ -4875,23 +4622,6 @@
         <a:font script="Viet" typeface="Arial"/>
         <a:font script="Uigh" typeface="Microsoft Uighur"/>
         <a:font script="Geor" typeface="Sylfaen"/>
-        <a:font script="Armn" typeface="Arial"/>
-        <a:font script="Bugi" typeface="Leelawadee UI"/>
-        <a:font script="Bopo" typeface="Microsoft JhengHei"/>
-        <a:font script="Java" typeface="Javanese Text"/>
-        <a:font script="Lisu" typeface="Segoe UI"/>
-        <a:font script="Mymr" typeface="Myanmar Text"/>
-        <a:font script="Nkoo" typeface="Ebrima"/>
-        <a:font script="Olck" typeface="Nirmala UI"/>
-        <a:font script="Osma" typeface="Ebrima"/>
-        <a:font script="Phag" typeface="Phagspa"/>
-        <a:font script="Syrn" typeface="Estrangelo Edessa"/>
-        <a:font script="Syrj" typeface="Estrangelo Edessa"/>
-        <a:font script="Syre" typeface="Estrangelo Edessa"/>
-        <a:font script="Sora" typeface="Nirmala UI"/>
-        <a:font script="Tale" typeface="Microsoft Tai Le"/>
-        <a:font script="Talu" typeface="Microsoft New Tai Lue"/>
-        <a:font script="Tfng" typeface="Ebrima"/>
       </a:minorFont>
     </a:fontScheme>
     <a:fmtScheme name="Office">
@@ -5032,8 +4762,6 @@
       </a:bgFillStyleLst>
     </a:fmtScheme>
   </a:themeElements>
-  <a:objectDefaults/>
-  <a:extraClrSchemeLst/>
   <a:extLst>
     <a:ext uri="{05A4C25C-085E-4340-85A3-A5531E510DB2}">
       <thm15:themeFamily xmlns:thm15="http://schemas.microsoft.com/office/thememl/2012/main" name="Office Theme" id="{62F939B6-93AF-4DB8-9C6B-D6C7DFDC589F}" vid="{4A3C46E8-61CC-4603-A589-7422A47A8E4A}"/>

</xml_diff>